<commit_message>
update sougu tec team buliding document
</commit_message>
<xml_diff>
--- a/搜谷v1.pptx
+++ b/搜谷v1.pptx
@@ -5,10 +5,10 @@
     <p:sldMasterId id="2147484493" r:id="rId4"/>
   </p:sldMasterIdLst>
   <p:notesMasterIdLst>
-    <p:notesMasterId r:id="rId23"/>
+    <p:notesMasterId r:id="rId24"/>
   </p:notesMasterIdLst>
   <p:handoutMasterIdLst>
-    <p:handoutMasterId r:id="rId24"/>
+    <p:handoutMasterId r:id="rId25"/>
   </p:handoutMasterIdLst>
   <p:sldIdLst>
     <p:sldId id="280" r:id="rId5"/>
@@ -22,13 +22,14 @@
     <p:sldId id="266" r:id="rId13"/>
     <p:sldId id="269" r:id="rId14"/>
     <p:sldId id="278" r:id="rId15"/>
-    <p:sldId id="279" r:id="rId16"/>
-    <p:sldId id="268" r:id="rId17"/>
-    <p:sldId id="270" r:id="rId18"/>
-    <p:sldId id="271" r:id="rId19"/>
-    <p:sldId id="273" r:id="rId20"/>
-    <p:sldId id="274" r:id="rId21"/>
-    <p:sldId id="275" r:id="rId22"/>
+    <p:sldId id="281" r:id="rId16"/>
+    <p:sldId id="279" r:id="rId17"/>
+    <p:sldId id="268" r:id="rId18"/>
+    <p:sldId id="270" r:id="rId19"/>
+    <p:sldId id="271" r:id="rId20"/>
+    <p:sldId id="273" r:id="rId21"/>
+    <p:sldId id="274" r:id="rId22"/>
+    <p:sldId id="275" r:id="rId23"/>
   </p:sldIdLst>
   <p:sldSz cx="12192000" cy="6858000"/>
   <p:notesSz cx="6858000" cy="9144000"/>
@@ -980,6 +981,100 @@
                 <a:ea typeface="Microsoft YaHei UI" panose="020B0503020204020204" pitchFamily="34" charset="-122"/>
               </a:rPr>
               <a:t>12</a:t>
+            </a:fld>
+            <a:endParaRPr lang="zh-CN" altLang="en-US">
+              <a:latin typeface="Microsoft YaHei UI" panose="020B0503020204020204" pitchFamily="34" charset="-122"/>
+              <a:ea typeface="Microsoft YaHei UI" panose="020B0503020204020204" pitchFamily="34" charset="-122"/>
+            </a:endParaRPr>
+          </a:p>
+        </p:txBody>
+      </p:sp>
+    </p:spTree>
+    <p:extLst>
+      <p:ext uri="{BB962C8B-B14F-4D97-AF65-F5344CB8AC3E}">
+        <p14:creationId xmlns:p14="http://schemas.microsoft.com/office/powerpoint/2010/main" val="1103067545"/>
+      </p:ext>
+    </p:extLst>
+  </p:cSld>
+  <p:clrMapOvr>
+    <a:masterClrMapping/>
+  </p:clrMapOvr>
+</p:notes>
+</file>
+
+<file path=ppt/notesSlides/notesSlide12.xml><?xml version="1.0" encoding="utf-8"?>
+<p:notes xmlns:a="http://schemas.openxmlformats.org/drawingml/2006/main" xmlns:r="http://schemas.openxmlformats.org/officeDocument/2006/relationships" xmlns:p="http://schemas.openxmlformats.org/presentationml/2006/main">
+  <p:cSld>
+    <p:spTree>
+      <p:nvGrpSpPr>
+        <p:cNvPr id="1" name=""/>
+        <p:cNvGrpSpPr/>
+        <p:nvPr/>
+      </p:nvGrpSpPr>
+      <p:grpSpPr>
+        <a:xfrm>
+          <a:off x="0" y="0"/>
+          <a:ext cx="0" cy="0"/>
+          <a:chOff x="0" y="0"/>
+          <a:chExt cx="0" cy="0"/>
+        </a:xfrm>
+      </p:grpSpPr>
+      <p:sp>
+        <p:nvSpPr>
+          <p:cNvPr id="2" name="幻灯片图像占位符 1"/>
+          <p:cNvSpPr>
+            <a:spLocks noGrp="1" noRot="1" noChangeAspect="1"/>
+          </p:cNvSpPr>
+          <p:nvPr>
+            <p:ph type="sldImg"/>
+          </p:nvPr>
+        </p:nvSpPr>
+        <p:spPr/>
+      </p:sp>
+      <p:sp>
+        <p:nvSpPr>
+          <p:cNvPr id="3" name="备注占位符 2"/>
+          <p:cNvSpPr>
+            <a:spLocks noGrp="1"/>
+          </p:cNvSpPr>
+          <p:nvPr>
+            <p:ph type="body" idx="1"/>
+          </p:nvPr>
+        </p:nvSpPr>
+        <p:spPr/>
+        <p:txBody>
+          <a:bodyPr/>
+          <a:lstStyle/>
+          <a:p>
+            <a:endParaRPr lang="zh-CN" altLang="en-US">
+              <a:latin typeface="Microsoft YaHei UI" panose="020B0503020204020204" pitchFamily="34" charset="-122"/>
+              <a:ea typeface="Microsoft YaHei UI" panose="020B0503020204020204" pitchFamily="34" charset="-122"/>
+            </a:endParaRPr>
+          </a:p>
+        </p:txBody>
+      </p:sp>
+      <p:sp>
+        <p:nvSpPr>
+          <p:cNvPr id="4" name="灯片编号占位符 3"/>
+          <p:cNvSpPr>
+            <a:spLocks noGrp="1"/>
+          </p:cNvSpPr>
+          <p:nvPr>
+            <p:ph type="sldNum" sz="quarter" idx="5"/>
+          </p:nvPr>
+        </p:nvSpPr>
+        <p:spPr/>
+        <p:txBody>
+          <a:bodyPr/>
+          <a:lstStyle/>
+          <a:p>
+            <a:pPr rtl="0"/>
+            <a:fld id="{F37BF602-06E2-416F-A0C6-72E3CC2DE1E7}" type="slidenum">
+              <a:rPr lang="en-US" altLang="zh-CN" smtClean="0">
+                <a:latin typeface="Microsoft YaHei UI" panose="020B0503020204020204" pitchFamily="34" charset="-122"/>
+                <a:ea typeface="Microsoft YaHei UI" panose="020B0503020204020204" pitchFamily="34" charset="-122"/>
+              </a:rPr>
+              <a:t>13</a:t>
             </a:fld>
             <a:endParaRPr lang="zh-CN" altLang="en-US">
               <a:latin typeface="Microsoft YaHei UI" panose="020B0503020204020204" pitchFamily="34" charset="-122"/>
@@ -13525,6 +13620,2059 @@
           <a:lstStyle/>
           <a:p>
             <a:r>
+              <a:rPr lang="zh-CN" altLang="en-US" sz="4600" spc="-150" dirty="0" smtClean="0"/>
+              <a:t>建模基准</a:t>
+            </a:r>
+            <a:endParaRPr lang="zh-CN" altLang="en-US" sz="2000" spc="-150" dirty="0"/>
+          </a:p>
+        </p:txBody>
+      </p:sp>
+      <p:graphicFrame>
+        <p:nvGraphicFramePr>
+          <p:cNvPr id="5" name="表格 4"/>
+          <p:cNvGraphicFramePr>
+            <a:graphicFrameLocks noGrp="1"/>
+          </p:cNvGraphicFramePr>
+          <p:nvPr>
+            <p:extLst>
+              <p:ext uri="{D42A27DB-BD31-4B8C-83A1-F6EECF244321}">
+                <p14:modId xmlns:p14="http://schemas.microsoft.com/office/powerpoint/2010/main" val="2126393769"/>
+              </p:ext>
+            </p:extLst>
+          </p:nvPr>
+        </p:nvGraphicFramePr>
+        <p:xfrm>
+          <a:off x="3352463" y="755607"/>
+          <a:ext cx="8135727" cy="5187997"/>
+        </p:xfrm>
+        <a:graphic>
+          <a:graphicData uri="http://schemas.openxmlformats.org/drawingml/2006/table">
+            <a:tbl>
+              <a:tblPr firstRow="1" bandRow="1">
+                <a:tableStyleId>{5C22544A-7EE6-4342-B048-85BDC9FD1C3A}</a:tableStyleId>
+              </a:tblPr>
+              <a:tblGrid>
+                <a:gridCol w="2711909">
+                  <a:extLst>
+                    <a:ext uri="{9D8B030D-6E8A-4147-A177-3AD203B41FA5}">
+                      <a16:colId xmlns:a16="http://schemas.microsoft.com/office/drawing/2014/main" val="3770404329"/>
+                    </a:ext>
+                  </a:extLst>
+                </a:gridCol>
+                <a:gridCol w="2711909">
+                  <a:extLst>
+                    <a:ext uri="{9D8B030D-6E8A-4147-A177-3AD203B41FA5}">
+                      <a16:colId xmlns:a16="http://schemas.microsoft.com/office/drawing/2014/main" val="15240180"/>
+                    </a:ext>
+                  </a:extLst>
+                </a:gridCol>
+                <a:gridCol w="2711909">
+                  <a:extLst>
+                    <a:ext uri="{9D8B030D-6E8A-4147-A177-3AD203B41FA5}">
+                      <a16:colId xmlns:a16="http://schemas.microsoft.com/office/drawing/2014/main" val="2566656303"/>
+                    </a:ext>
+                  </a:extLst>
+                </a:gridCol>
+              </a:tblGrid>
+              <a:tr h="468158">
+                <a:tc>
+                  <a:txBody>
+                    <a:bodyPr/>
+                    <a:lstStyle/>
+                    <a:p>
+                      <a:pPr marL="0" marR="0" lvl="0" indent="0" algn="l" defTabSz="914400" rtl="0" eaLnBrk="1" fontAlgn="auto" latinLnBrk="0" hangingPunct="1">
+                        <a:lnSpc>
+                          <a:spcPct val="100000"/>
+                        </a:lnSpc>
+                        <a:spcBef>
+                          <a:spcPts val="0"/>
+                        </a:spcBef>
+                        <a:spcAft>
+                          <a:spcPts val="0"/>
+                        </a:spcAft>
+                        <a:buClrTx/>
+                        <a:buSzTx/>
+                        <a:buFontTx/>
+                        <a:buNone/>
+                        <a:tabLst/>
+                        <a:defRPr/>
+                      </a:pPr>
+                      <a:r>
+                        <a:rPr kumimoji="0" lang="zh-CN" altLang="en-US" sz="1400" b="0" i="0" u="none" strike="noStrike" kern="1200" cap="none" spc="0" normalizeH="0" baseline="0" noProof="0" dirty="0" smtClean="0">
+                          <a:ln>
+                            <a:noFill/>
+                          </a:ln>
+                          <a:solidFill>
+                            <a:prstClr val="black"/>
+                          </a:solidFill>
+                          <a:effectLst/>
+                          <a:uLnTx/>
+                          <a:uFillTx/>
+                          <a:latin typeface="宋体" panose="02010600030101010101" pitchFamily="2" charset="-122"/>
+                          <a:ea typeface="宋体" panose="02010600030101010101" pitchFamily="2" charset="-122"/>
+                          <a:cs typeface="+mn-cs"/>
+                        </a:rPr>
+                        <a:t>项</a:t>
+                      </a:r>
+                      <a:endParaRPr kumimoji="0" lang="en-US" altLang="zh-CN" sz="1400" b="0" i="0" u="none" strike="noStrike" kern="1200" cap="none" spc="0" normalizeH="0" baseline="0" noProof="0" dirty="0" smtClean="0">
+                        <a:ln>
+                          <a:noFill/>
+                        </a:ln>
+                        <a:solidFill>
+                          <a:prstClr val="black"/>
+                        </a:solidFill>
+                        <a:effectLst/>
+                        <a:uLnTx/>
+                        <a:uFillTx/>
+                        <a:latin typeface="宋体" panose="02010600030101010101" pitchFamily="2" charset="-122"/>
+                        <a:ea typeface="宋体" panose="02010600030101010101" pitchFamily="2" charset="-122"/>
+                        <a:cs typeface="+mn-cs"/>
+                      </a:endParaRPr>
+                    </a:p>
+                  </a:txBody>
+                  <a:tcPr anchor="ctr" anchorCtr="1"/>
+                </a:tc>
+                <a:tc>
+                  <a:txBody>
+                    <a:bodyPr/>
+                    <a:lstStyle/>
+                    <a:p>
+                      <a:pPr marL="0" marR="0" lvl="0" indent="0" algn="l" defTabSz="914400" rtl="0" eaLnBrk="1" fontAlgn="auto" latinLnBrk="0" hangingPunct="1">
+                        <a:lnSpc>
+                          <a:spcPct val="100000"/>
+                        </a:lnSpc>
+                        <a:spcBef>
+                          <a:spcPts val="0"/>
+                        </a:spcBef>
+                        <a:spcAft>
+                          <a:spcPts val="0"/>
+                        </a:spcAft>
+                        <a:buClrTx/>
+                        <a:buSzTx/>
+                        <a:buFontTx/>
+                        <a:buNone/>
+                        <a:tabLst/>
+                        <a:defRPr/>
+                      </a:pPr>
+                      <a:r>
+                        <a:rPr kumimoji="0" lang="zh-CN" altLang="en-US" sz="1400" b="0" i="0" u="none" strike="noStrike" kern="1200" cap="none" spc="0" normalizeH="0" baseline="0" noProof="0" dirty="0" smtClean="0">
+                          <a:ln>
+                            <a:noFill/>
+                          </a:ln>
+                          <a:solidFill>
+                            <a:prstClr val="black"/>
+                          </a:solidFill>
+                          <a:effectLst/>
+                          <a:uLnTx/>
+                          <a:uFillTx/>
+                          <a:latin typeface="宋体" panose="02010600030101010101" pitchFamily="2" charset="-122"/>
+                          <a:ea typeface="宋体" panose="02010600030101010101" pitchFamily="2" charset="-122"/>
+                          <a:cs typeface="+mn-cs"/>
+                        </a:rPr>
+                        <a:t>基准</a:t>
+                      </a:r>
+                      <a:endParaRPr kumimoji="0" lang="en-US" altLang="zh-CN" sz="1400" b="0" i="0" u="none" strike="noStrike" kern="1200" cap="none" spc="0" normalizeH="0" baseline="0" noProof="0" dirty="0" smtClean="0">
+                        <a:ln>
+                          <a:noFill/>
+                        </a:ln>
+                        <a:solidFill>
+                          <a:prstClr val="black"/>
+                        </a:solidFill>
+                        <a:effectLst/>
+                        <a:uLnTx/>
+                        <a:uFillTx/>
+                        <a:latin typeface="宋体" panose="02010600030101010101" pitchFamily="2" charset="-122"/>
+                        <a:ea typeface="宋体" panose="02010600030101010101" pitchFamily="2" charset="-122"/>
+                        <a:cs typeface="+mn-cs"/>
+                      </a:endParaRPr>
+                    </a:p>
+                  </a:txBody>
+                  <a:tcPr anchor="ctr" anchorCtr="1"/>
+                </a:tc>
+                <a:tc>
+                  <a:txBody>
+                    <a:bodyPr/>
+                    <a:lstStyle/>
+                    <a:p>
+                      <a:pPr marL="0" marR="0" lvl="0" indent="0" algn="l" defTabSz="914400" rtl="0" eaLnBrk="1" fontAlgn="auto" latinLnBrk="0" hangingPunct="1">
+                        <a:lnSpc>
+                          <a:spcPct val="100000"/>
+                        </a:lnSpc>
+                        <a:spcBef>
+                          <a:spcPts val="0"/>
+                        </a:spcBef>
+                        <a:spcAft>
+                          <a:spcPts val="0"/>
+                        </a:spcAft>
+                        <a:buClrTx/>
+                        <a:buSzTx/>
+                        <a:buFontTx/>
+                        <a:buNone/>
+                        <a:tabLst/>
+                        <a:defRPr/>
+                      </a:pPr>
+                      <a:r>
+                        <a:rPr kumimoji="0" lang="zh-CN" altLang="en-US" sz="1400" b="0" i="0" u="none" strike="noStrike" kern="1200" cap="none" spc="0" normalizeH="0" baseline="0" noProof="0" dirty="0" smtClean="0">
+                          <a:ln>
+                            <a:noFill/>
+                          </a:ln>
+                          <a:solidFill>
+                            <a:prstClr val="black"/>
+                          </a:solidFill>
+                          <a:effectLst/>
+                          <a:uLnTx/>
+                          <a:uFillTx/>
+                          <a:latin typeface="宋体" panose="02010600030101010101" pitchFamily="2" charset="-122"/>
+                          <a:ea typeface="宋体" panose="02010600030101010101" pitchFamily="2" charset="-122"/>
+                          <a:cs typeface="+mn-cs"/>
+                        </a:rPr>
+                        <a:t>参考</a:t>
+                      </a:r>
+                      <a:endParaRPr kumimoji="0" lang="en-US" altLang="zh-CN" sz="1400" b="0" i="0" u="none" strike="noStrike" kern="1200" cap="none" spc="0" normalizeH="0" baseline="0" noProof="0" dirty="0" smtClean="0">
+                        <a:ln>
+                          <a:noFill/>
+                        </a:ln>
+                        <a:solidFill>
+                          <a:prstClr val="black"/>
+                        </a:solidFill>
+                        <a:effectLst/>
+                        <a:uLnTx/>
+                        <a:uFillTx/>
+                        <a:latin typeface="宋体" panose="02010600030101010101" pitchFamily="2" charset="-122"/>
+                        <a:ea typeface="宋体" panose="02010600030101010101" pitchFamily="2" charset="-122"/>
+                        <a:cs typeface="+mn-cs"/>
+                      </a:endParaRPr>
+                    </a:p>
+                  </a:txBody>
+                  <a:tcPr anchor="ctr" anchorCtr="1"/>
+                </a:tc>
+                <a:extLst>
+                  <a:ext uri="{0D108BD9-81ED-4DB2-BD59-A6C34878D82A}">
+                    <a16:rowId xmlns:a16="http://schemas.microsoft.com/office/drawing/2014/main" val="2194787996"/>
+                  </a:ext>
+                </a:extLst>
+              </a:tr>
+              <a:tr h="501133">
+                <a:tc>
+                  <a:txBody>
+                    <a:bodyPr/>
+                    <a:lstStyle/>
+                    <a:p>
+                      <a:pPr marL="0" marR="0" lvl="0" indent="0" algn="l" defTabSz="914400" rtl="0" eaLnBrk="1" fontAlgn="auto" latinLnBrk="0" hangingPunct="1">
+                        <a:lnSpc>
+                          <a:spcPct val="100000"/>
+                        </a:lnSpc>
+                        <a:spcBef>
+                          <a:spcPts val="0"/>
+                        </a:spcBef>
+                        <a:spcAft>
+                          <a:spcPts val="0"/>
+                        </a:spcAft>
+                        <a:buClrTx/>
+                        <a:buSzTx/>
+                        <a:buFontTx/>
+                        <a:buNone/>
+                        <a:tabLst/>
+                        <a:defRPr/>
+                      </a:pPr>
+                      <a:r>
+                        <a:rPr lang="zh-CN" altLang="en-US" sz="1100" b="1" i="0" kern="1200" dirty="0" smtClean="0">
+                          <a:solidFill>
+                            <a:schemeClr val="dk1"/>
+                          </a:solidFill>
+                          <a:effectLst/>
+                          <a:latin typeface="宋体" panose="02010600030101010101" pitchFamily="2" charset="-122"/>
+                          <a:ea typeface="宋体" panose="02010600030101010101" pitchFamily="2" charset="-122"/>
+                          <a:cs typeface="+mn-cs"/>
+                        </a:rPr>
+                        <a:t>时间周期</a:t>
+                      </a:r>
+                      <a:endParaRPr lang="en-US" altLang="zh-CN" sz="1100" b="1" i="0" kern="1200" dirty="0" smtClean="0">
+                        <a:solidFill>
+                          <a:schemeClr val="dk1"/>
+                        </a:solidFill>
+                        <a:effectLst/>
+                        <a:latin typeface="宋体" panose="02010600030101010101" pitchFamily="2" charset="-122"/>
+                        <a:ea typeface="宋体" panose="02010600030101010101" pitchFamily="2" charset="-122"/>
+                        <a:cs typeface="+mn-cs"/>
+                      </a:endParaRPr>
+                    </a:p>
+                  </a:txBody>
+                  <a:tcPr anchor="ctr"/>
+                </a:tc>
+                <a:tc>
+                  <a:txBody>
+                    <a:bodyPr/>
+                    <a:lstStyle/>
+                    <a:p>
+                      <a:pPr marL="0" marR="0" lvl="0" indent="0" algn="l" defTabSz="914400" rtl="0" eaLnBrk="1" fontAlgn="auto" latinLnBrk="0" hangingPunct="1">
+                        <a:lnSpc>
+                          <a:spcPct val="100000"/>
+                        </a:lnSpc>
+                        <a:spcBef>
+                          <a:spcPts val="0"/>
+                        </a:spcBef>
+                        <a:spcAft>
+                          <a:spcPts val="0"/>
+                        </a:spcAft>
+                        <a:buClrTx/>
+                        <a:buSzTx/>
+                        <a:buFontTx/>
+                        <a:buNone/>
+                        <a:tabLst/>
+                        <a:defRPr/>
+                      </a:pPr>
+                      <a:r>
+                        <a:rPr kumimoji="0" lang="zh-CN" altLang="en-US" sz="1100" b="0" i="0" u="none" strike="noStrike" kern="1200" cap="none" spc="0" normalizeH="0" baseline="0" noProof="0" dirty="0" smtClean="0">
+                          <a:ln>
+                            <a:noFill/>
+                          </a:ln>
+                          <a:solidFill>
+                            <a:prstClr val="black"/>
+                          </a:solidFill>
+                          <a:effectLst/>
+                          <a:uLnTx/>
+                          <a:uFillTx/>
+                          <a:latin typeface="宋体" panose="02010600030101010101" pitchFamily="2" charset="-122"/>
+                          <a:ea typeface="宋体" panose="02010600030101010101" pitchFamily="2" charset="-122"/>
+                          <a:cs typeface="+mn-cs"/>
+                        </a:rPr>
+                        <a:t>月</a:t>
+                      </a:r>
+                      <a:endParaRPr kumimoji="0" lang="en-US" altLang="zh-CN" sz="1100" b="0" i="0" u="none" strike="noStrike" kern="1200" cap="none" spc="0" normalizeH="0" baseline="0" noProof="0" dirty="0" smtClean="0">
+                        <a:ln>
+                          <a:noFill/>
+                        </a:ln>
+                        <a:solidFill>
+                          <a:prstClr val="black"/>
+                        </a:solidFill>
+                        <a:effectLst/>
+                        <a:uLnTx/>
+                        <a:uFillTx/>
+                        <a:latin typeface="宋体" panose="02010600030101010101" pitchFamily="2" charset="-122"/>
+                        <a:ea typeface="宋体" panose="02010600030101010101" pitchFamily="2" charset="-122"/>
+                        <a:cs typeface="+mn-cs"/>
+                      </a:endParaRPr>
+                    </a:p>
+                  </a:txBody>
+                  <a:tcPr anchor="ctr"/>
+                </a:tc>
+                <a:tc>
+                  <a:txBody>
+                    <a:bodyPr/>
+                    <a:lstStyle/>
+                    <a:p>
+                      <a:pPr marL="0" marR="0" lvl="0" indent="0" algn="l" defTabSz="914400" rtl="0" eaLnBrk="1" fontAlgn="auto" latinLnBrk="0" hangingPunct="1">
+                        <a:lnSpc>
+                          <a:spcPct val="100000"/>
+                        </a:lnSpc>
+                        <a:spcBef>
+                          <a:spcPts val="0"/>
+                        </a:spcBef>
+                        <a:spcAft>
+                          <a:spcPts val="0"/>
+                        </a:spcAft>
+                        <a:buClrTx/>
+                        <a:buSzTx/>
+                        <a:buFontTx/>
+                        <a:buNone/>
+                        <a:tabLst/>
+                        <a:defRPr/>
+                      </a:pPr>
+                      <a:endParaRPr kumimoji="0" lang="en-US" altLang="zh-CN" sz="1100" b="0" i="0" u="none" strike="noStrike" kern="1200" cap="none" spc="0" normalizeH="0" baseline="0" noProof="0" dirty="0" smtClean="0">
+                        <a:ln>
+                          <a:noFill/>
+                        </a:ln>
+                        <a:solidFill>
+                          <a:prstClr val="black"/>
+                        </a:solidFill>
+                        <a:effectLst/>
+                        <a:uLnTx/>
+                        <a:uFillTx/>
+                        <a:latin typeface="宋体" panose="02010600030101010101" pitchFamily="2" charset="-122"/>
+                        <a:ea typeface="宋体" panose="02010600030101010101" pitchFamily="2" charset="-122"/>
+                        <a:cs typeface="+mn-cs"/>
+                      </a:endParaRPr>
+                    </a:p>
+                  </a:txBody>
+                  <a:tcPr anchor="ctr"/>
+                </a:tc>
+                <a:extLst>
+                  <a:ext uri="{0D108BD9-81ED-4DB2-BD59-A6C34878D82A}">
+                    <a16:rowId xmlns:a16="http://schemas.microsoft.com/office/drawing/2014/main" val="495770301"/>
+                  </a:ext>
+                </a:extLst>
+              </a:tr>
+              <a:tr h="704381">
+                <a:tc>
+                  <a:txBody>
+                    <a:bodyPr/>
+                    <a:lstStyle/>
+                    <a:p>
+                      <a:pPr marL="0" marR="0" lvl="0" indent="0" algn="l" defTabSz="914400" rtl="0" eaLnBrk="1" fontAlgn="auto" latinLnBrk="0" hangingPunct="1">
+                        <a:lnSpc>
+                          <a:spcPct val="100000"/>
+                        </a:lnSpc>
+                        <a:spcBef>
+                          <a:spcPts val="0"/>
+                        </a:spcBef>
+                        <a:spcAft>
+                          <a:spcPts val="0"/>
+                        </a:spcAft>
+                        <a:buClrTx/>
+                        <a:buSzTx/>
+                        <a:buFontTx/>
+                        <a:buNone/>
+                        <a:tabLst/>
+                        <a:defRPr/>
+                      </a:pPr>
+                      <a:r>
+                        <a:rPr kumimoji="0" lang="zh-CN" altLang="en-US" sz="1100" b="1" i="0" u="none" strike="noStrike" kern="1200" cap="none" spc="0" normalizeH="0" baseline="0" noProof="0" dirty="0" smtClean="0">
+                          <a:ln>
+                            <a:noFill/>
+                          </a:ln>
+                          <a:solidFill>
+                            <a:prstClr val="black"/>
+                          </a:solidFill>
+                          <a:effectLst/>
+                          <a:uLnTx/>
+                          <a:uFillTx/>
+                          <a:latin typeface="宋体" panose="02010600030101010101" pitchFamily="2" charset="-122"/>
+                          <a:ea typeface="宋体" panose="02010600030101010101" pitchFamily="2" charset="-122"/>
+                          <a:cs typeface="+mn-cs"/>
+                        </a:rPr>
+                        <a:t>司机数量</a:t>
+                      </a:r>
+                      <a:endParaRPr kumimoji="0" lang="en-US" altLang="zh-CN" sz="1100" b="1" i="0" u="none" strike="noStrike" kern="1200" cap="none" spc="0" normalizeH="0" baseline="0" noProof="0" dirty="0" smtClean="0">
+                        <a:ln>
+                          <a:noFill/>
+                        </a:ln>
+                        <a:solidFill>
+                          <a:prstClr val="black"/>
+                        </a:solidFill>
+                        <a:effectLst/>
+                        <a:uLnTx/>
+                        <a:uFillTx/>
+                        <a:latin typeface="宋体" panose="02010600030101010101" pitchFamily="2" charset="-122"/>
+                        <a:ea typeface="宋体" panose="02010600030101010101" pitchFamily="2" charset="-122"/>
+                        <a:cs typeface="+mn-cs"/>
+                      </a:endParaRPr>
+                    </a:p>
+                  </a:txBody>
+                  <a:tcPr anchor="ctr"/>
+                </a:tc>
+                <a:tc>
+                  <a:txBody>
+                    <a:bodyPr/>
+                    <a:lstStyle/>
+                    <a:p>
+                      <a:pPr marL="0" marR="0" lvl="0" indent="0" algn="l" defTabSz="914400" rtl="0" eaLnBrk="1" fontAlgn="auto" latinLnBrk="0" hangingPunct="1">
+                        <a:lnSpc>
+                          <a:spcPct val="100000"/>
+                        </a:lnSpc>
+                        <a:spcBef>
+                          <a:spcPts val="0"/>
+                        </a:spcBef>
+                        <a:spcAft>
+                          <a:spcPts val="0"/>
+                        </a:spcAft>
+                        <a:buClrTx/>
+                        <a:buSzTx/>
+                        <a:buFontTx/>
+                        <a:buNone/>
+                        <a:tabLst/>
+                        <a:defRPr/>
+                      </a:pPr>
+                      <a:r>
+                        <a:rPr lang="en-US" altLang="zh-CN" sz="1100" b="0" dirty="0" smtClean="0">
+                          <a:latin typeface="宋体" panose="02010600030101010101" pitchFamily="2" charset="-122"/>
+                          <a:ea typeface="宋体" panose="02010600030101010101" pitchFamily="2" charset="-122"/>
+                        </a:rPr>
+                        <a:t>5000</a:t>
+                      </a:r>
+                      <a:endParaRPr kumimoji="0" lang="en-US" altLang="zh-CN" sz="1100" b="0" i="0" u="none" strike="noStrike" kern="1200" cap="none" spc="0" normalizeH="0" baseline="0" noProof="0" dirty="0" smtClean="0">
+                        <a:ln>
+                          <a:noFill/>
+                        </a:ln>
+                        <a:solidFill>
+                          <a:prstClr val="black"/>
+                        </a:solidFill>
+                        <a:effectLst/>
+                        <a:uLnTx/>
+                        <a:uFillTx/>
+                        <a:latin typeface="宋体" panose="02010600030101010101" pitchFamily="2" charset="-122"/>
+                        <a:ea typeface="宋体" panose="02010600030101010101" pitchFamily="2" charset="-122"/>
+                        <a:cs typeface="+mn-cs"/>
+                      </a:endParaRPr>
+                    </a:p>
+                  </a:txBody>
+                  <a:tcPr anchor="ctr"/>
+                </a:tc>
+                <a:tc>
+                  <a:txBody>
+                    <a:bodyPr/>
+                    <a:lstStyle/>
+                    <a:p>
+                      <a:pPr marL="0" marR="0" lvl="0" indent="0" algn="l" defTabSz="914400" rtl="0" eaLnBrk="1" fontAlgn="auto" latinLnBrk="0" hangingPunct="1">
+                        <a:lnSpc>
+                          <a:spcPct val="100000"/>
+                        </a:lnSpc>
+                        <a:spcBef>
+                          <a:spcPts val="0"/>
+                        </a:spcBef>
+                        <a:spcAft>
+                          <a:spcPts val="0"/>
+                        </a:spcAft>
+                        <a:buClrTx/>
+                        <a:buSzTx/>
+                        <a:buFontTx/>
+                        <a:buNone/>
+                        <a:tabLst/>
+                        <a:defRPr/>
+                      </a:pPr>
+                      <a:endParaRPr kumimoji="0" lang="en-US" altLang="zh-CN" sz="1100" b="0" i="0" u="none" strike="noStrike" kern="1200" cap="none" spc="0" normalizeH="0" baseline="0" noProof="0" dirty="0" smtClean="0">
+                        <a:ln>
+                          <a:noFill/>
+                        </a:ln>
+                        <a:solidFill>
+                          <a:prstClr val="black"/>
+                        </a:solidFill>
+                        <a:effectLst/>
+                        <a:uLnTx/>
+                        <a:uFillTx/>
+                        <a:latin typeface="宋体" panose="02010600030101010101" pitchFamily="2" charset="-122"/>
+                        <a:ea typeface="宋体" panose="02010600030101010101" pitchFamily="2" charset="-122"/>
+                        <a:cs typeface="+mn-cs"/>
+                      </a:endParaRPr>
+                    </a:p>
+                  </a:txBody>
+                  <a:tcPr anchor="ctr"/>
+                </a:tc>
+                <a:extLst>
+                  <a:ext uri="{0D108BD9-81ED-4DB2-BD59-A6C34878D82A}">
+                    <a16:rowId xmlns:a16="http://schemas.microsoft.com/office/drawing/2014/main" val="2775758797"/>
+                  </a:ext>
+                </a:extLst>
+              </a:tr>
+              <a:tr h="501133">
+                <a:tc>
+                  <a:txBody>
+                    <a:bodyPr/>
+                    <a:lstStyle/>
+                    <a:p>
+                      <a:pPr marL="0" marR="0" lvl="0" indent="0" algn="l" defTabSz="914400" rtl="0" eaLnBrk="1" fontAlgn="auto" latinLnBrk="0" hangingPunct="1">
+                        <a:lnSpc>
+                          <a:spcPct val="100000"/>
+                        </a:lnSpc>
+                        <a:spcBef>
+                          <a:spcPts val="0"/>
+                        </a:spcBef>
+                        <a:spcAft>
+                          <a:spcPts val="0"/>
+                        </a:spcAft>
+                        <a:buClrTx/>
+                        <a:buSzTx/>
+                        <a:buFontTx/>
+                        <a:buNone/>
+                        <a:tabLst/>
+                        <a:defRPr/>
+                      </a:pPr>
+                      <a:r>
+                        <a:rPr kumimoji="0" lang="zh-CN" altLang="en-US" sz="1100" b="1" i="0" u="none" strike="noStrike" kern="1200" cap="none" spc="0" normalizeH="0" baseline="0" noProof="0" dirty="0" smtClean="0">
+                          <a:ln>
+                            <a:noFill/>
+                          </a:ln>
+                          <a:solidFill>
+                            <a:prstClr val="black"/>
+                          </a:solidFill>
+                          <a:effectLst/>
+                          <a:uLnTx/>
+                          <a:uFillTx/>
+                          <a:latin typeface="宋体" panose="02010600030101010101" pitchFamily="2" charset="-122"/>
+                          <a:ea typeface="宋体" panose="02010600030101010101" pitchFamily="2" charset="-122"/>
+                          <a:cs typeface="+mn-cs"/>
+                        </a:rPr>
+                        <a:t>每日交易成单量</a:t>
+                      </a:r>
+                      <a:endParaRPr kumimoji="0" lang="en-US" altLang="zh-CN" sz="1100" b="1" i="0" u="none" strike="noStrike" kern="1200" cap="none" spc="0" normalizeH="0" baseline="0" noProof="0" dirty="0" smtClean="0">
+                        <a:ln>
+                          <a:noFill/>
+                        </a:ln>
+                        <a:solidFill>
+                          <a:prstClr val="black"/>
+                        </a:solidFill>
+                        <a:effectLst/>
+                        <a:uLnTx/>
+                        <a:uFillTx/>
+                        <a:latin typeface="宋体" panose="02010600030101010101" pitchFamily="2" charset="-122"/>
+                        <a:ea typeface="宋体" panose="02010600030101010101" pitchFamily="2" charset="-122"/>
+                        <a:cs typeface="+mn-cs"/>
+                      </a:endParaRPr>
+                    </a:p>
+                  </a:txBody>
+                  <a:tcPr anchor="ctr"/>
+                </a:tc>
+                <a:tc>
+                  <a:txBody>
+                    <a:bodyPr/>
+                    <a:lstStyle/>
+                    <a:p>
+                      <a:pPr marL="0" marR="0" lvl="0" indent="0" algn="l" defTabSz="914400" rtl="0" eaLnBrk="1" fontAlgn="auto" latinLnBrk="0" hangingPunct="1">
+                        <a:lnSpc>
+                          <a:spcPct val="100000"/>
+                        </a:lnSpc>
+                        <a:spcBef>
+                          <a:spcPts val="0"/>
+                        </a:spcBef>
+                        <a:spcAft>
+                          <a:spcPts val="0"/>
+                        </a:spcAft>
+                        <a:buClrTx/>
+                        <a:buSzTx/>
+                        <a:buFontTx/>
+                        <a:buNone/>
+                        <a:tabLst/>
+                        <a:defRPr/>
+                      </a:pPr>
+                      <a:r>
+                        <a:rPr kumimoji="0" lang="en-US" altLang="zh-CN" sz="1100" b="0" i="0" u="none" strike="noStrike" kern="1200" cap="none" spc="0" normalizeH="0" baseline="0" noProof="0" dirty="0" smtClean="0">
+                          <a:ln>
+                            <a:noFill/>
+                          </a:ln>
+                          <a:solidFill>
+                            <a:prstClr val="black"/>
+                          </a:solidFill>
+                          <a:effectLst/>
+                          <a:uLnTx/>
+                          <a:uFillTx/>
+                          <a:latin typeface="宋体" panose="02010600030101010101" pitchFamily="2" charset="-122"/>
+                          <a:ea typeface="宋体" panose="02010600030101010101" pitchFamily="2" charset="-122"/>
+                          <a:cs typeface="+mn-cs"/>
+                        </a:rPr>
+                        <a:t>10</a:t>
+                      </a:r>
+                      <a:endParaRPr kumimoji="0" lang="en-US" altLang="zh-CN" sz="1100" b="0" i="0" u="none" strike="noStrike" kern="1200" cap="none" spc="0" normalizeH="0" baseline="0" noProof="0" dirty="0" smtClean="0">
+                        <a:ln>
+                          <a:noFill/>
+                        </a:ln>
+                        <a:solidFill>
+                          <a:prstClr val="black"/>
+                        </a:solidFill>
+                        <a:effectLst/>
+                        <a:uLnTx/>
+                        <a:uFillTx/>
+                        <a:latin typeface="宋体" panose="02010600030101010101" pitchFamily="2" charset="-122"/>
+                        <a:ea typeface="宋体" panose="02010600030101010101" pitchFamily="2" charset="-122"/>
+                        <a:cs typeface="+mn-cs"/>
+                      </a:endParaRPr>
+                    </a:p>
+                  </a:txBody>
+                  <a:tcPr anchor="ctr"/>
+                </a:tc>
+                <a:tc>
+                  <a:txBody>
+                    <a:bodyPr/>
+                    <a:lstStyle/>
+                    <a:p>
+                      <a:pPr marL="0" marR="0" lvl="0" indent="0" algn="l" defTabSz="914400" rtl="0" eaLnBrk="1" fontAlgn="auto" latinLnBrk="0" hangingPunct="1">
+                        <a:lnSpc>
+                          <a:spcPct val="100000"/>
+                        </a:lnSpc>
+                        <a:spcBef>
+                          <a:spcPts val="0"/>
+                        </a:spcBef>
+                        <a:spcAft>
+                          <a:spcPts val="0"/>
+                        </a:spcAft>
+                        <a:buClrTx/>
+                        <a:buSzTx/>
+                        <a:buFontTx/>
+                        <a:buNone/>
+                        <a:tabLst/>
+                        <a:defRPr/>
+                      </a:pPr>
+                      <a:r>
+                        <a:rPr lang="zh-CN" altLang="en-US" sz="1100" b="0" i="0" kern="1200" dirty="0" smtClean="0">
+                          <a:solidFill>
+                            <a:schemeClr val="dk1"/>
+                          </a:solidFill>
+                          <a:effectLst/>
+                          <a:latin typeface="宋体" panose="02010600030101010101" pitchFamily="2" charset="-122"/>
+                          <a:ea typeface="宋体" panose="02010600030101010101" pitchFamily="2" charset="-122"/>
+                          <a:cs typeface="+mn-cs"/>
+                        </a:rPr>
+                        <a:t>参考美团打车客户端的平均成单量</a:t>
+                      </a:r>
+                      <a:endParaRPr kumimoji="0" lang="en-US" altLang="zh-CN" sz="1100" b="0" i="0" u="none" strike="noStrike" kern="1200" cap="none" spc="0" normalizeH="0" baseline="0" noProof="0" dirty="0" smtClean="0">
+                        <a:ln>
+                          <a:noFill/>
+                        </a:ln>
+                        <a:solidFill>
+                          <a:prstClr val="black"/>
+                        </a:solidFill>
+                        <a:effectLst/>
+                        <a:uLnTx/>
+                        <a:uFillTx/>
+                        <a:latin typeface="宋体" panose="02010600030101010101" pitchFamily="2" charset="-122"/>
+                        <a:ea typeface="宋体" panose="02010600030101010101" pitchFamily="2" charset="-122"/>
+                        <a:cs typeface="+mn-cs"/>
+                      </a:endParaRPr>
+                    </a:p>
+                  </a:txBody>
+                  <a:tcPr anchor="ctr"/>
+                </a:tc>
+                <a:extLst>
+                  <a:ext uri="{0D108BD9-81ED-4DB2-BD59-A6C34878D82A}">
+                    <a16:rowId xmlns:a16="http://schemas.microsoft.com/office/drawing/2014/main" val="1744052419"/>
+                  </a:ext>
+                </a:extLst>
+              </a:tr>
+              <a:tr h="430456">
+                <a:tc>
+                  <a:txBody>
+                    <a:bodyPr/>
+                    <a:lstStyle/>
+                    <a:p>
+                      <a:pPr marL="0" marR="0" lvl="0" indent="0" algn="l" defTabSz="914400" rtl="0" eaLnBrk="1" fontAlgn="auto" latinLnBrk="0" hangingPunct="1">
+                        <a:lnSpc>
+                          <a:spcPct val="100000"/>
+                        </a:lnSpc>
+                        <a:spcBef>
+                          <a:spcPts val="0"/>
+                        </a:spcBef>
+                        <a:spcAft>
+                          <a:spcPts val="0"/>
+                        </a:spcAft>
+                        <a:buClrTx/>
+                        <a:buSzTx/>
+                        <a:buFontTx/>
+                        <a:buNone/>
+                        <a:tabLst/>
+                        <a:defRPr/>
+                      </a:pPr>
+                      <a:r>
+                        <a:rPr kumimoji="0" lang="zh-CN" altLang="en-US" sz="1100" b="1" i="0" u="none" strike="noStrike" kern="1200" cap="none" spc="0" normalizeH="0" baseline="0" noProof="0" dirty="0" smtClean="0">
+                          <a:ln>
+                            <a:noFill/>
+                          </a:ln>
+                          <a:solidFill>
+                            <a:prstClr val="black"/>
+                          </a:solidFill>
+                          <a:effectLst/>
+                          <a:uLnTx/>
+                          <a:uFillTx/>
+                          <a:latin typeface="宋体" panose="02010600030101010101" pitchFamily="2" charset="-122"/>
+                          <a:ea typeface="宋体" panose="02010600030101010101" pitchFamily="2" charset="-122"/>
+                          <a:cs typeface="+mn-cs"/>
+                        </a:rPr>
+                        <a:t>下单率</a:t>
+                      </a:r>
+                      <a:endParaRPr kumimoji="0" lang="en-US" altLang="zh-CN" sz="1100" b="1" i="0" u="none" strike="noStrike" kern="1200" cap="none" spc="0" normalizeH="0" baseline="0" noProof="0" dirty="0" smtClean="0">
+                        <a:ln>
+                          <a:noFill/>
+                        </a:ln>
+                        <a:solidFill>
+                          <a:prstClr val="black"/>
+                        </a:solidFill>
+                        <a:effectLst/>
+                        <a:uLnTx/>
+                        <a:uFillTx/>
+                        <a:latin typeface="宋体" panose="02010600030101010101" pitchFamily="2" charset="-122"/>
+                        <a:ea typeface="宋体" panose="02010600030101010101" pitchFamily="2" charset="-122"/>
+                        <a:cs typeface="+mn-cs"/>
+                      </a:endParaRPr>
+                    </a:p>
+                  </a:txBody>
+                  <a:tcPr anchor="ctr"/>
+                </a:tc>
+                <a:tc>
+                  <a:txBody>
+                    <a:bodyPr/>
+                    <a:lstStyle/>
+                    <a:p>
+                      <a:pPr marL="0" marR="0" lvl="0" indent="0" algn="l" defTabSz="914400" rtl="0" eaLnBrk="1" fontAlgn="auto" latinLnBrk="0" hangingPunct="1">
+                        <a:lnSpc>
+                          <a:spcPct val="100000"/>
+                        </a:lnSpc>
+                        <a:spcBef>
+                          <a:spcPts val="0"/>
+                        </a:spcBef>
+                        <a:spcAft>
+                          <a:spcPts val="0"/>
+                        </a:spcAft>
+                        <a:buClrTx/>
+                        <a:buSzTx/>
+                        <a:buFontTx/>
+                        <a:buNone/>
+                        <a:tabLst/>
+                        <a:defRPr/>
+                      </a:pPr>
+                      <a:r>
+                        <a:rPr kumimoji="0" lang="en-US" altLang="zh-CN" sz="1100" b="0" i="0" u="none" strike="noStrike" kern="1200" cap="none" spc="0" normalizeH="0" baseline="0" noProof="0" dirty="0" smtClean="0">
+                          <a:ln>
+                            <a:noFill/>
+                          </a:ln>
+                          <a:solidFill>
+                            <a:prstClr val="black"/>
+                          </a:solidFill>
+                          <a:effectLst/>
+                          <a:uLnTx/>
+                          <a:uFillTx/>
+                          <a:latin typeface="宋体" panose="02010600030101010101" pitchFamily="2" charset="-122"/>
+                          <a:ea typeface="宋体" panose="02010600030101010101" pitchFamily="2" charset="-122"/>
+                          <a:cs typeface="+mn-cs"/>
+                        </a:rPr>
+                        <a:t>10%</a:t>
+                      </a:r>
+                      <a:endParaRPr kumimoji="0" lang="en-US" altLang="zh-CN" sz="1100" b="0" i="0" u="none" strike="noStrike" kern="1200" cap="none" spc="0" normalizeH="0" baseline="0" noProof="0" dirty="0" smtClean="0">
+                        <a:ln>
+                          <a:noFill/>
+                        </a:ln>
+                        <a:solidFill>
+                          <a:prstClr val="black"/>
+                        </a:solidFill>
+                        <a:effectLst/>
+                        <a:uLnTx/>
+                        <a:uFillTx/>
+                        <a:latin typeface="宋体" panose="02010600030101010101" pitchFamily="2" charset="-122"/>
+                        <a:ea typeface="宋体" panose="02010600030101010101" pitchFamily="2" charset="-122"/>
+                        <a:cs typeface="+mn-cs"/>
+                      </a:endParaRPr>
+                    </a:p>
+                  </a:txBody>
+                  <a:tcPr anchor="ctr"/>
+                </a:tc>
+                <a:tc>
+                  <a:txBody>
+                    <a:bodyPr/>
+                    <a:lstStyle/>
+                    <a:p>
+                      <a:pPr marL="0" marR="0" lvl="0" indent="0" algn="l" defTabSz="914400" rtl="0" eaLnBrk="1" fontAlgn="auto" latinLnBrk="0" hangingPunct="1">
+                        <a:lnSpc>
+                          <a:spcPct val="100000"/>
+                        </a:lnSpc>
+                        <a:spcBef>
+                          <a:spcPts val="0"/>
+                        </a:spcBef>
+                        <a:spcAft>
+                          <a:spcPts val="0"/>
+                        </a:spcAft>
+                        <a:buClrTx/>
+                        <a:buSzTx/>
+                        <a:buFontTx/>
+                        <a:buNone/>
+                        <a:tabLst/>
+                        <a:defRPr/>
+                      </a:pPr>
+                      <a:r>
+                        <a:rPr lang="zh-CN" altLang="en-US" sz="1100" b="0" i="0" kern="1200" dirty="0" smtClean="0">
+                          <a:solidFill>
+                            <a:schemeClr val="dk1"/>
+                          </a:solidFill>
+                          <a:effectLst/>
+                          <a:latin typeface="宋体" panose="02010600030101010101" pitchFamily="2" charset="-122"/>
+                          <a:ea typeface="宋体" panose="02010600030101010101" pitchFamily="2" charset="-122"/>
+                          <a:cs typeface="+mn-cs"/>
+                        </a:rPr>
+                        <a:t>参考美团打车客户端的平均成单率</a:t>
+                      </a:r>
+                      <a:endParaRPr kumimoji="0" lang="en-US" altLang="zh-CN" sz="1100" b="0" i="0" u="none" strike="noStrike" kern="1200" cap="none" spc="0" normalizeH="0" baseline="0" noProof="0" dirty="0" smtClean="0">
+                        <a:ln>
+                          <a:noFill/>
+                        </a:ln>
+                        <a:solidFill>
+                          <a:prstClr val="black"/>
+                        </a:solidFill>
+                        <a:effectLst/>
+                        <a:uLnTx/>
+                        <a:uFillTx/>
+                        <a:latin typeface="宋体" panose="02010600030101010101" pitchFamily="2" charset="-122"/>
+                        <a:ea typeface="宋体" panose="02010600030101010101" pitchFamily="2" charset="-122"/>
+                        <a:cs typeface="+mn-cs"/>
+                      </a:endParaRPr>
+                    </a:p>
+                  </a:txBody>
+                  <a:tcPr anchor="ctr"/>
+                </a:tc>
+                <a:extLst>
+                  <a:ext uri="{0D108BD9-81ED-4DB2-BD59-A6C34878D82A}">
+                    <a16:rowId xmlns:a16="http://schemas.microsoft.com/office/drawing/2014/main" val="149933922"/>
+                  </a:ext>
+                </a:extLst>
+              </a:tr>
+              <a:tr h="430456">
+                <a:tc>
+                  <a:txBody>
+                    <a:bodyPr/>
+                    <a:lstStyle/>
+                    <a:p>
+                      <a:pPr marL="0" marR="0" lvl="0" indent="0" algn="l" defTabSz="914400" rtl="0" eaLnBrk="1" fontAlgn="auto" latinLnBrk="0" hangingPunct="1">
+                        <a:lnSpc>
+                          <a:spcPct val="100000"/>
+                        </a:lnSpc>
+                        <a:spcBef>
+                          <a:spcPts val="0"/>
+                        </a:spcBef>
+                        <a:spcAft>
+                          <a:spcPts val="0"/>
+                        </a:spcAft>
+                        <a:buClrTx/>
+                        <a:buSzTx/>
+                        <a:buFontTx/>
+                        <a:buNone/>
+                        <a:tabLst/>
+                        <a:defRPr/>
+                      </a:pPr>
+                      <a:r>
+                        <a:rPr lang="zh-CN" altLang="en-US" sz="1100" b="1" i="0" kern="1200" dirty="0" smtClean="0">
+                          <a:solidFill>
+                            <a:schemeClr val="dk1"/>
+                          </a:solidFill>
+                          <a:effectLst/>
+                          <a:latin typeface="宋体" panose="02010600030101010101" pitchFamily="2" charset="-122"/>
+                          <a:ea typeface="宋体" panose="02010600030101010101" pitchFamily="2" charset="-122"/>
+                          <a:cs typeface="+mn-cs"/>
+                        </a:rPr>
+                        <a:t>峰值承重比例</a:t>
+                      </a:r>
+                      <a:endParaRPr lang="en-US" altLang="zh-CN" sz="1100" b="1" i="0" kern="1200" dirty="0" smtClean="0">
+                        <a:solidFill>
+                          <a:schemeClr val="dk1"/>
+                        </a:solidFill>
+                        <a:effectLst/>
+                        <a:latin typeface="宋体" panose="02010600030101010101" pitchFamily="2" charset="-122"/>
+                        <a:ea typeface="宋体" panose="02010600030101010101" pitchFamily="2" charset="-122"/>
+                        <a:cs typeface="+mn-cs"/>
+                      </a:endParaRPr>
+                    </a:p>
+                  </a:txBody>
+                  <a:tcPr anchor="ctr"/>
+                </a:tc>
+                <a:tc>
+                  <a:txBody>
+                    <a:bodyPr/>
+                    <a:lstStyle/>
+                    <a:p>
+                      <a:pPr marL="0" marR="0" lvl="0" indent="0" algn="l" defTabSz="914400" rtl="0" eaLnBrk="1" fontAlgn="auto" latinLnBrk="0" hangingPunct="1">
+                        <a:lnSpc>
+                          <a:spcPct val="100000"/>
+                        </a:lnSpc>
+                        <a:spcBef>
+                          <a:spcPts val="0"/>
+                        </a:spcBef>
+                        <a:spcAft>
+                          <a:spcPts val="0"/>
+                        </a:spcAft>
+                        <a:buClrTx/>
+                        <a:buSzTx/>
+                        <a:buFontTx/>
+                        <a:buNone/>
+                        <a:tabLst/>
+                        <a:defRPr/>
+                      </a:pPr>
+                      <a:r>
+                        <a:rPr kumimoji="0" lang="en-US" altLang="zh-CN" sz="1100" b="0" i="0" u="none" strike="noStrike" kern="1200" cap="none" spc="0" normalizeH="0" baseline="0" noProof="0" dirty="0" smtClean="0">
+                          <a:ln>
+                            <a:noFill/>
+                          </a:ln>
+                          <a:solidFill>
+                            <a:prstClr val="black"/>
+                          </a:solidFill>
+                          <a:effectLst/>
+                          <a:uLnTx/>
+                          <a:uFillTx/>
+                          <a:latin typeface="宋体" panose="02010600030101010101" pitchFamily="2" charset="-122"/>
+                          <a:ea typeface="宋体" panose="02010600030101010101" pitchFamily="2" charset="-122"/>
+                          <a:cs typeface="+mn-cs"/>
+                        </a:rPr>
+                        <a:t>1</a:t>
+                      </a:r>
+                      <a:r>
+                        <a:rPr kumimoji="0" lang="zh-CN" altLang="en-US" sz="1100" b="0" i="0" u="none" strike="noStrike" kern="1200" cap="none" spc="0" normalizeH="0" baseline="0" noProof="0" dirty="0" smtClean="0">
+                          <a:ln>
+                            <a:noFill/>
+                          </a:ln>
+                          <a:solidFill>
+                            <a:prstClr val="black"/>
+                          </a:solidFill>
+                          <a:effectLst/>
+                          <a:uLnTx/>
+                          <a:uFillTx/>
+                          <a:latin typeface="宋体" panose="02010600030101010101" pitchFamily="2" charset="-122"/>
+                          <a:ea typeface="宋体" panose="02010600030101010101" pitchFamily="2" charset="-122"/>
+                          <a:cs typeface="+mn-cs"/>
+                        </a:rPr>
+                        <a:t>：</a:t>
+                      </a:r>
+                      <a:r>
+                        <a:rPr kumimoji="0" lang="en-US" altLang="zh-CN" sz="1100" b="0" i="0" u="none" strike="noStrike" kern="1200" cap="none" spc="0" normalizeH="0" baseline="0" noProof="0" dirty="0" smtClean="0">
+                          <a:ln>
+                            <a:noFill/>
+                          </a:ln>
+                          <a:solidFill>
+                            <a:prstClr val="black"/>
+                          </a:solidFill>
+                          <a:effectLst/>
+                          <a:uLnTx/>
+                          <a:uFillTx/>
+                          <a:latin typeface="宋体" panose="02010600030101010101" pitchFamily="2" charset="-122"/>
+                          <a:ea typeface="宋体" panose="02010600030101010101" pitchFamily="2" charset="-122"/>
+                          <a:cs typeface="+mn-cs"/>
+                        </a:rPr>
+                        <a:t>5</a:t>
+                      </a:r>
+                      <a:endParaRPr kumimoji="0" lang="en-US" altLang="zh-CN" sz="1100" b="0" i="0" u="none" strike="noStrike" kern="1200" cap="none" spc="0" normalizeH="0" baseline="0" noProof="0" dirty="0" smtClean="0">
+                        <a:ln>
+                          <a:noFill/>
+                        </a:ln>
+                        <a:solidFill>
+                          <a:prstClr val="black"/>
+                        </a:solidFill>
+                        <a:effectLst/>
+                        <a:uLnTx/>
+                        <a:uFillTx/>
+                        <a:latin typeface="宋体" panose="02010600030101010101" pitchFamily="2" charset="-122"/>
+                        <a:ea typeface="宋体" panose="02010600030101010101" pitchFamily="2" charset="-122"/>
+                        <a:cs typeface="+mn-cs"/>
+                      </a:endParaRPr>
+                    </a:p>
+                  </a:txBody>
+                  <a:tcPr anchor="ctr"/>
+                </a:tc>
+                <a:tc>
+                  <a:txBody>
+                    <a:bodyPr/>
+                    <a:lstStyle/>
+                    <a:p>
+                      <a:pPr marL="0" marR="0" lvl="0" indent="0" algn="l" defTabSz="914400" rtl="0" eaLnBrk="1" fontAlgn="auto" latinLnBrk="0" hangingPunct="1">
+                        <a:lnSpc>
+                          <a:spcPct val="100000"/>
+                        </a:lnSpc>
+                        <a:spcBef>
+                          <a:spcPts val="0"/>
+                        </a:spcBef>
+                        <a:spcAft>
+                          <a:spcPts val="0"/>
+                        </a:spcAft>
+                        <a:buClrTx/>
+                        <a:buSzTx/>
+                        <a:buFontTx/>
+                        <a:buNone/>
+                        <a:tabLst/>
+                        <a:defRPr/>
+                      </a:pPr>
+                      <a:r>
+                        <a:rPr lang="zh-CN" altLang="en-US" sz="1100" b="0" i="0" kern="1200" dirty="0" smtClean="0">
+                          <a:solidFill>
+                            <a:schemeClr val="dk1"/>
+                          </a:solidFill>
+                          <a:effectLst/>
+                          <a:latin typeface="宋体" panose="02010600030101010101" pitchFamily="2" charset="-122"/>
+                          <a:ea typeface="宋体" panose="02010600030101010101" pitchFamily="2" charset="-122"/>
+                          <a:cs typeface="+mn-cs"/>
+                        </a:rPr>
+                        <a:t>峰值为评价值的</a:t>
+                      </a:r>
+                      <a:r>
+                        <a:rPr lang="en-US" altLang="zh-CN" sz="1100" b="0" i="0" kern="1200" dirty="0" smtClean="0">
+                          <a:solidFill>
+                            <a:schemeClr val="dk1"/>
+                          </a:solidFill>
+                          <a:effectLst/>
+                          <a:latin typeface="宋体" panose="02010600030101010101" pitchFamily="2" charset="-122"/>
+                          <a:ea typeface="宋体" panose="02010600030101010101" pitchFamily="2" charset="-122"/>
+                          <a:cs typeface="+mn-cs"/>
+                        </a:rPr>
+                        <a:t>5</a:t>
+                      </a:r>
+                      <a:r>
+                        <a:rPr lang="zh-CN" altLang="en-US" sz="1100" b="0" i="0" kern="1200" dirty="0" smtClean="0">
+                          <a:solidFill>
+                            <a:schemeClr val="dk1"/>
+                          </a:solidFill>
+                          <a:effectLst/>
+                          <a:latin typeface="宋体" panose="02010600030101010101" pitchFamily="2" charset="-122"/>
+                          <a:ea typeface="宋体" panose="02010600030101010101" pitchFamily="2" charset="-122"/>
+                          <a:cs typeface="+mn-cs"/>
+                        </a:rPr>
+                        <a:t>倍，经验估算</a:t>
+                      </a:r>
+                      <a:endParaRPr kumimoji="0" lang="en-US" altLang="zh-CN" sz="1100" b="0" i="0" u="none" strike="noStrike" kern="1200" cap="none" spc="0" normalizeH="0" baseline="0" noProof="0" dirty="0" smtClean="0">
+                        <a:ln>
+                          <a:noFill/>
+                        </a:ln>
+                        <a:solidFill>
+                          <a:prstClr val="black"/>
+                        </a:solidFill>
+                        <a:effectLst/>
+                        <a:uLnTx/>
+                        <a:uFillTx/>
+                        <a:latin typeface="宋体" panose="02010600030101010101" pitchFamily="2" charset="-122"/>
+                        <a:ea typeface="宋体" panose="02010600030101010101" pitchFamily="2" charset="-122"/>
+                        <a:cs typeface="+mn-cs"/>
+                      </a:endParaRPr>
+                    </a:p>
+                  </a:txBody>
+                  <a:tcPr anchor="ctr"/>
+                </a:tc>
+                <a:extLst>
+                  <a:ext uri="{0D108BD9-81ED-4DB2-BD59-A6C34878D82A}">
+                    <a16:rowId xmlns:a16="http://schemas.microsoft.com/office/drawing/2014/main" val="550602250"/>
+                  </a:ext>
+                </a:extLst>
+              </a:tr>
+              <a:tr h="430456">
+                <a:tc>
+                  <a:txBody>
+                    <a:bodyPr/>
+                    <a:lstStyle/>
+                    <a:p>
+                      <a:pPr marL="0" marR="0" lvl="0" indent="0" algn="l" defTabSz="914400" rtl="0" eaLnBrk="1" fontAlgn="auto" latinLnBrk="0" hangingPunct="1">
+                        <a:lnSpc>
+                          <a:spcPct val="100000"/>
+                        </a:lnSpc>
+                        <a:spcBef>
+                          <a:spcPts val="0"/>
+                        </a:spcBef>
+                        <a:spcAft>
+                          <a:spcPts val="0"/>
+                        </a:spcAft>
+                        <a:buClrTx/>
+                        <a:buSzTx/>
+                        <a:buFontTx/>
+                        <a:buNone/>
+                        <a:tabLst/>
+                        <a:defRPr/>
+                      </a:pPr>
+                      <a:r>
+                        <a:rPr lang="zh-CN" altLang="en-US" sz="1100" b="1" i="0" kern="1200" dirty="0" smtClean="0">
+                          <a:solidFill>
+                            <a:schemeClr val="dk1"/>
+                          </a:solidFill>
+                          <a:effectLst/>
+                          <a:latin typeface="宋体" panose="02010600030101010101" pitchFamily="2" charset="-122"/>
+                          <a:ea typeface="宋体" panose="02010600030101010101" pitchFamily="2" charset="-122"/>
+                          <a:cs typeface="+mn-cs"/>
+                        </a:rPr>
+                        <a:t>单台大型服务器预估峰值</a:t>
+                      </a:r>
+                      <a:r>
+                        <a:rPr lang="en-US" altLang="zh-CN" sz="1100" b="1" i="0" kern="1200" dirty="0" smtClean="0">
+                          <a:solidFill>
+                            <a:schemeClr val="dk1"/>
+                          </a:solidFill>
+                          <a:effectLst/>
+                          <a:latin typeface="宋体" panose="02010600030101010101" pitchFamily="2" charset="-122"/>
+                          <a:ea typeface="宋体" panose="02010600030101010101" pitchFamily="2" charset="-122"/>
+                          <a:cs typeface="+mn-cs"/>
+                        </a:rPr>
+                        <a:t>QPS</a:t>
+                      </a:r>
+                    </a:p>
+                  </a:txBody>
+                  <a:tcPr anchor="ctr"/>
+                </a:tc>
+                <a:tc>
+                  <a:txBody>
+                    <a:bodyPr/>
+                    <a:lstStyle/>
+                    <a:p>
+                      <a:pPr marL="0" marR="0" lvl="0" indent="0" algn="l" defTabSz="914400" rtl="0" eaLnBrk="1" fontAlgn="auto" latinLnBrk="0" hangingPunct="1">
+                        <a:lnSpc>
+                          <a:spcPct val="100000"/>
+                        </a:lnSpc>
+                        <a:spcBef>
+                          <a:spcPts val="0"/>
+                        </a:spcBef>
+                        <a:spcAft>
+                          <a:spcPts val="0"/>
+                        </a:spcAft>
+                        <a:buClrTx/>
+                        <a:buSzTx/>
+                        <a:buFontTx/>
+                        <a:buNone/>
+                        <a:tabLst/>
+                        <a:defRPr/>
+                      </a:pPr>
+                      <a:r>
+                        <a:rPr kumimoji="0" lang="en-US" altLang="zh-CN" sz="1100" b="0" i="0" u="none" strike="noStrike" kern="1200" cap="none" spc="0" normalizeH="0" baseline="0" noProof="0" dirty="0" smtClean="0">
+                          <a:ln>
+                            <a:noFill/>
+                          </a:ln>
+                          <a:solidFill>
+                            <a:prstClr val="black"/>
+                          </a:solidFill>
+                          <a:effectLst/>
+                          <a:uLnTx/>
+                          <a:uFillTx/>
+                          <a:latin typeface="宋体" panose="02010600030101010101" pitchFamily="2" charset="-122"/>
+                          <a:ea typeface="宋体" panose="02010600030101010101" pitchFamily="2" charset="-122"/>
+                          <a:cs typeface="+mn-cs"/>
+                        </a:rPr>
+                        <a:t>100</a:t>
+                      </a:r>
+                      <a:r>
+                        <a:rPr kumimoji="0" lang="zh-CN" altLang="en-US" sz="1100" b="0" i="0" u="none" strike="noStrike" kern="1200" cap="none" spc="0" normalizeH="0" baseline="0" noProof="0" dirty="0" smtClean="0">
+                          <a:ln>
+                            <a:noFill/>
+                          </a:ln>
+                          <a:solidFill>
+                            <a:prstClr val="black"/>
+                          </a:solidFill>
+                          <a:effectLst/>
+                          <a:uLnTx/>
+                          <a:uFillTx/>
+                          <a:latin typeface="宋体" panose="02010600030101010101" pitchFamily="2" charset="-122"/>
+                          <a:ea typeface="宋体" panose="02010600030101010101" pitchFamily="2" charset="-122"/>
+                          <a:cs typeface="+mn-cs"/>
+                        </a:rPr>
+                        <a:t>次</a:t>
+                      </a:r>
+                      <a:endParaRPr kumimoji="0" lang="en-US" altLang="zh-CN" sz="1100" b="0" i="0" u="none" strike="noStrike" kern="1200" cap="none" spc="0" normalizeH="0" baseline="0" noProof="0" dirty="0" smtClean="0">
+                        <a:ln>
+                          <a:noFill/>
+                        </a:ln>
+                        <a:solidFill>
+                          <a:prstClr val="black"/>
+                        </a:solidFill>
+                        <a:effectLst/>
+                        <a:uLnTx/>
+                        <a:uFillTx/>
+                        <a:latin typeface="宋体" panose="02010600030101010101" pitchFamily="2" charset="-122"/>
+                        <a:ea typeface="宋体" panose="02010600030101010101" pitchFamily="2" charset="-122"/>
+                        <a:cs typeface="+mn-cs"/>
+                      </a:endParaRPr>
+                    </a:p>
+                  </a:txBody>
+                  <a:tcPr anchor="ctr"/>
+                </a:tc>
+                <a:tc>
+                  <a:txBody>
+                    <a:bodyPr/>
+                    <a:lstStyle/>
+                    <a:p>
+                      <a:pPr marL="0" marR="0" lvl="0" indent="0" algn="l" defTabSz="914400" rtl="0" eaLnBrk="1" fontAlgn="auto" latinLnBrk="0" hangingPunct="1">
+                        <a:lnSpc>
+                          <a:spcPct val="100000"/>
+                        </a:lnSpc>
+                        <a:spcBef>
+                          <a:spcPts val="0"/>
+                        </a:spcBef>
+                        <a:spcAft>
+                          <a:spcPts val="0"/>
+                        </a:spcAft>
+                        <a:buClrTx/>
+                        <a:buSzTx/>
+                        <a:buFontTx/>
+                        <a:buNone/>
+                        <a:tabLst/>
+                        <a:defRPr/>
+                      </a:pPr>
+                      <a:endParaRPr kumimoji="0" lang="en-US" altLang="zh-CN" sz="1100" b="0" i="0" u="none" strike="noStrike" kern="1200" cap="none" spc="0" normalizeH="0" baseline="0" noProof="0" dirty="0" smtClean="0">
+                        <a:ln>
+                          <a:noFill/>
+                        </a:ln>
+                        <a:solidFill>
+                          <a:prstClr val="black"/>
+                        </a:solidFill>
+                        <a:effectLst/>
+                        <a:uLnTx/>
+                        <a:uFillTx/>
+                        <a:latin typeface="宋体" panose="02010600030101010101" pitchFamily="2" charset="-122"/>
+                        <a:ea typeface="宋体" panose="02010600030101010101" pitchFamily="2" charset="-122"/>
+                        <a:cs typeface="+mn-cs"/>
+                      </a:endParaRPr>
+                    </a:p>
+                  </a:txBody>
+                  <a:tcPr anchor="ctr"/>
+                </a:tc>
+                <a:extLst>
+                  <a:ext uri="{0D108BD9-81ED-4DB2-BD59-A6C34878D82A}">
+                    <a16:rowId xmlns:a16="http://schemas.microsoft.com/office/drawing/2014/main" val="1364034062"/>
+                  </a:ext>
+                </a:extLst>
+              </a:tr>
+              <a:tr h="430456">
+                <a:tc>
+                  <a:txBody>
+                    <a:bodyPr/>
+                    <a:lstStyle/>
+                    <a:p>
+                      <a:pPr marL="0" marR="0" lvl="0" indent="0" algn="l" defTabSz="914400" rtl="0" eaLnBrk="1" fontAlgn="auto" latinLnBrk="0" hangingPunct="1">
+                        <a:lnSpc>
+                          <a:spcPct val="100000"/>
+                        </a:lnSpc>
+                        <a:spcBef>
+                          <a:spcPts val="0"/>
+                        </a:spcBef>
+                        <a:spcAft>
+                          <a:spcPts val="0"/>
+                        </a:spcAft>
+                        <a:buClrTx/>
+                        <a:buSzTx/>
+                        <a:buFontTx/>
+                        <a:buNone/>
+                        <a:tabLst/>
+                        <a:defRPr/>
+                      </a:pPr>
+                      <a:r>
+                        <a:rPr kumimoji="0" lang="zh-CN" altLang="en-US" sz="1100" b="1" i="0" u="none" strike="noStrike" kern="1200" cap="none" spc="0" normalizeH="0" baseline="0" noProof="0" dirty="0" smtClean="0">
+                          <a:ln>
+                            <a:noFill/>
+                          </a:ln>
+                          <a:solidFill>
+                            <a:prstClr val="black"/>
+                          </a:solidFill>
+                          <a:effectLst/>
+                          <a:uLnTx/>
+                          <a:uFillTx/>
+                          <a:latin typeface="宋体" panose="02010600030101010101" pitchFamily="2" charset="-122"/>
+                          <a:ea typeface="宋体" panose="02010600030101010101" pitchFamily="2" charset="-122"/>
+                          <a:cs typeface="+mn-cs"/>
+                        </a:rPr>
+                        <a:t>服务器性能冗余系数</a:t>
+                      </a:r>
+                      <a:endParaRPr kumimoji="0" lang="en-US" altLang="zh-CN" sz="1100" b="1" i="0" u="none" strike="noStrike" kern="1200" cap="none" spc="0" normalizeH="0" baseline="0" noProof="0" dirty="0" smtClean="0">
+                        <a:ln>
+                          <a:noFill/>
+                        </a:ln>
+                        <a:solidFill>
+                          <a:prstClr val="black"/>
+                        </a:solidFill>
+                        <a:effectLst/>
+                        <a:uLnTx/>
+                        <a:uFillTx/>
+                        <a:latin typeface="宋体" panose="02010600030101010101" pitchFamily="2" charset="-122"/>
+                        <a:ea typeface="宋体" panose="02010600030101010101" pitchFamily="2" charset="-122"/>
+                        <a:cs typeface="+mn-cs"/>
+                      </a:endParaRPr>
+                    </a:p>
+                  </a:txBody>
+                  <a:tcPr anchor="ctr"/>
+                </a:tc>
+                <a:tc>
+                  <a:txBody>
+                    <a:bodyPr/>
+                    <a:lstStyle/>
+                    <a:p>
+                      <a:pPr marL="0" marR="0" lvl="0" indent="0" algn="l" defTabSz="914400" rtl="0" eaLnBrk="1" fontAlgn="auto" latinLnBrk="0" hangingPunct="1">
+                        <a:lnSpc>
+                          <a:spcPct val="100000"/>
+                        </a:lnSpc>
+                        <a:spcBef>
+                          <a:spcPts val="0"/>
+                        </a:spcBef>
+                        <a:spcAft>
+                          <a:spcPts val="0"/>
+                        </a:spcAft>
+                        <a:buClrTx/>
+                        <a:buSzTx/>
+                        <a:buFontTx/>
+                        <a:buNone/>
+                        <a:tabLst/>
+                        <a:defRPr/>
+                      </a:pPr>
+                      <a:r>
+                        <a:rPr lang="en-US" altLang="zh-CN" sz="1100" b="0" i="0" kern="1200" dirty="0" smtClean="0">
+                          <a:solidFill>
+                            <a:schemeClr val="dk1"/>
+                          </a:solidFill>
+                          <a:effectLst/>
+                          <a:latin typeface="宋体" panose="02010600030101010101" pitchFamily="2" charset="-122"/>
+                          <a:ea typeface="宋体" panose="02010600030101010101" pitchFamily="2" charset="-122"/>
+                          <a:cs typeface="+mn-cs"/>
+                        </a:rPr>
+                        <a:t>0.2</a:t>
+                      </a:r>
+                    </a:p>
+                  </a:txBody>
+                  <a:tcPr anchor="ctr"/>
+                </a:tc>
+                <a:tc>
+                  <a:txBody>
+                    <a:bodyPr/>
+                    <a:lstStyle/>
+                    <a:p>
+                      <a:pPr marL="0" marR="0" lvl="0" indent="0" algn="l" defTabSz="914400" rtl="0" eaLnBrk="1" fontAlgn="auto" latinLnBrk="0" hangingPunct="1">
+                        <a:lnSpc>
+                          <a:spcPct val="100000"/>
+                        </a:lnSpc>
+                        <a:spcBef>
+                          <a:spcPts val="0"/>
+                        </a:spcBef>
+                        <a:spcAft>
+                          <a:spcPts val="0"/>
+                        </a:spcAft>
+                        <a:buClrTx/>
+                        <a:buSzTx/>
+                        <a:buFontTx/>
+                        <a:buNone/>
+                        <a:tabLst/>
+                        <a:defRPr/>
+                      </a:pPr>
+                      <a:r>
+                        <a:rPr kumimoji="0" lang="zh-CN" altLang="en-US" sz="1100" b="0" i="0" u="none" strike="noStrike" kern="1200" cap="none" spc="0" normalizeH="0" baseline="0" noProof="0" dirty="0" smtClean="0">
+                          <a:ln>
+                            <a:noFill/>
+                          </a:ln>
+                          <a:solidFill>
+                            <a:prstClr val="black"/>
+                          </a:solidFill>
+                          <a:effectLst/>
+                          <a:uLnTx/>
+                          <a:uFillTx/>
+                          <a:latin typeface="宋体" panose="02010600030101010101" pitchFamily="2" charset="-122"/>
+                          <a:ea typeface="宋体" panose="02010600030101010101" pitchFamily="2" charset="-122"/>
+                          <a:cs typeface="+mn-cs"/>
+                        </a:rPr>
+                        <a:t>在原有基础上扩展</a:t>
+                      </a:r>
+                      <a:r>
+                        <a:rPr kumimoji="0" lang="en-US" altLang="zh-CN" sz="1100" b="0" i="0" u="none" strike="noStrike" kern="1200" cap="none" spc="0" normalizeH="0" baseline="0" noProof="0" dirty="0" smtClean="0">
+                          <a:ln>
+                            <a:noFill/>
+                          </a:ln>
+                          <a:solidFill>
+                            <a:prstClr val="black"/>
+                          </a:solidFill>
+                          <a:effectLst/>
+                          <a:uLnTx/>
+                          <a:uFillTx/>
+                          <a:latin typeface="宋体" panose="02010600030101010101" pitchFamily="2" charset="-122"/>
+                          <a:ea typeface="宋体" panose="02010600030101010101" pitchFamily="2" charset="-122"/>
+                          <a:cs typeface="+mn-cs"/>
+                        </a:rPr>
+                        <a:t>0.2</a:t>
+                      </a:r>
+                      <a:r>
+                        <a:rPr kumimoji="0" lang="zh-CN" altLang="en-US" sz="1100" b="0" i="0" u="none" strike="noStrike" kern="1200" cap="none" spc="0" normalizeH="0" baseline="0" noProof="0" dirty="0" smtClean="0">
+                          <a:ln>
+                            <a:noFill/>
+                          </a:ln>
+                          <a:solidFill>
+                            <a:prstClr val="black"/>
+                          </a:solidFill>
+                          <a:effectLst/>
+                          <a:uLnTx/>
+                          <a:uFillTx/>
+                          <a:latin typeface="宋体" panose="02010600030101010101" pitchFamily="2" charset="-122"/>
+                          <a:ea typeface="宋体" panose="02010600030101010101" pitchFamily="2" charset="-122"/>
+                          <a:cs typeface="+mn-cs"/>
+                        </a:rPr>
+                        <a:t>的冗余空间</a:t>
+                      </a:r>
+                      <a:endParaRPr kumimoji="0" lang="en-US" altLang="zh-CN" sz="1100" b="0" i="0" u="none" strike="noStrike" kern="1200" cap="none" spc="0" normalizeH="0" baseline="0" noProof="0" dirty="0" smtClean="0">
+                        <a:ln>
+                          <a:noFill/>
+                        </a:ln>
+                        <a:solidFill>
+                          <a:prstClr val="black"/>
+                        </a:solidFill>
+                        <a:effectLst/>
+                        <a:uLnTx/>
+                        <a:uFillTx/>
+                        <a:latin typeface="宋体" panose="02010600030101010101" pitchFamily="2" charset="-122"/>
+                        <a:ea typeface="宋体" panose="02010600030101010101" pitchFamily="2" charset="-122"/>
+                        <a:cs typeface="+mn-cs"/>
+                      </a:endParaRPr>
+                    </a:p>
+                  </a:txBody>
+                  <a:tcPr anchor="ctr"/>
+                </a:tc>
+                <a:extLst>
+                  <a:ext uri="{0D108BD9-81ED-4DB2-BD59-A6C34878D82A}">
+                    <a16:rowId xmlns:a16="http://schemas.microsoft.com/office/drawing/2014/main" val="1309210260"/>
+                  </a:ext>
+                </a:extLst>
+              </a:tr>
+              <a:tr h="430456">
+                <a:tc>
+                  <a:txBody>
+                    <a:bodyPr/>
+                    <a:lstStyle/>
+                    <a:p>
+                      <a:pPr marL="0" marR="0" lvl="0" indent="0" algn="l" defTabSz="914400" rtl="0" eaLnBrk="1" fontAlgn="auto" latinLnBrk="0" hangingPunct="1">
+                        <a:lnSpc>
+                          <a:spcPct val="100000"/>
+                        </a:lnSpc>
+                        <a:spcBef>
+                          <a:spcPts val="0"/>
+                        </a:spcBef>
+                        <a:spcAft>
+                          <a:spcPts val="0"/>
+                        </a:spcAft>
+                        <a:buClrTx/>
+                        <a:buSzTx/>
+                        <a:buFontTx/>
+                        <a:buNone/>
+                        <a:tabLst/>
+                        <a:defRPr/>
+                      </a:pPr>
+                      <a:r>
+                        <a:rPr kumimoji="0" lang="en-US" altLang="zh-CN" sz="1100" b="1" i="0" u="none" strike="noStrike" kern="1200" cap="none" spc="0" normalizeH="0" baseline="0" noProof="0" dirty="0" err="1" smtClean="0">
+                          <a:ln>
+                            <a:noFill/>
+                          </a:ln>
+                          <a:solidFill>
+                            <a:prstClr val="black"/>
+                          </a:solidFill>
+                          <a:effectLst/>
+                          <a:uLnTx/>
+                          <a:uFillTx/>
+                          <a:latin typeface="宋体" panose="02010600030101010101" pitchFamily="2" charset="-122"/>
+                          <a:ea typeface="宋体" panose="02010600030101010101" pitchFamily="2" charset="-122"/>
+                          <a:cs typeface="+mn-cs"/>
+                        </a:rPr>
+                        <a:t>Pv</a:t>
+                      </a:r>
+                      <a:endParaRPr kumimoji="0" lang="en-US" altLang="zh-CN" sz="1100" b="1" i="0" u="none" strike="noStrike" kern="1200" cap="none" spc="0" normalizeH="0" baseline="0" noProof="0" dirty="0" smtClean="0">
+                        <a:ln>
+                          <a:noFill/>
+                        </a:ln>
+                        <a:solidFill>
+                          <a:prstClr val="black"/>
+                        </a:solidFill>
+                        <a:effectLst/>
+                        <a:uLnTx/>
+                        <a:uFillTx/>
+                        <a:latin typeface="宋体" panose="02010600030101010101" pitchFamily="2" charset="-122"/>
+                        <a:ea typeface="宋体" panose="02010600030101010101" pitchFamily="2" charset="-122"/>
+                        <a:cs typeface="+mn-cs"/>
+                      </a:endParaRPr>
+                    </a:p>
+                  </a:txBody>
+                  <a:tcPr anchor="ctr"/>
+                </a:tc>
+                <a:tc>
+                  <a:txBody>
+                    <a:bodyPr/>
+                    <a:lstStyle/>
+                    <a:p>
+                      <a:pPr marL="0" marR="0" lvl="0" indent="0" algn="l" defTabSz="914400" rtl="0" eaLnBrk="1" fontAlgn="auto" latinLnBrk="0" hangingPunct="1">
+                        <a:lnSpc>
+                          <a:spcPct val="100000"/>
+                        </a:lnSpc>
+                        <a:spcBef>
+                          <a:spcPts val="0"/>
+                        </a:spcBef>
+                        <a:spcAft>
+                          <a:spcPts val="0"/>
+                        </a:spcAft>
+                        <a:buClrTx/>
+                        <a:buSzTx/>
+                        <a:buFontTx/>
+                        <a:buNone/>
+                        <a:tabLst/>
+                        <a:defRPr/>
+                      </a:pPr>
+                      <a:r>
+                        <a:rPr lang="zh-CN" altLang="en-US" sz="1100" b="0" i="0" kern="1200" dirty="0" smtClean="0">
+                          <a:solidFill>
+                            <a:schemeClr val="dk1"/>
+                          </a:solidFill>
+                          <a:effectLst/>
+                          <a:latin typeface="宋体" panose="02010600030101010101" pitchFamily="2" charset="-122"/>
+                          <a:ea typeface="宋体" panose="02010600030101010101" pitchFamily="2" charset="-122"/>
+                          <a:cs typeface="+mn-cs"/>
+                        </a:rPr>
+                        <a:t>页面浏览量</a:t>
+                      </a:r>
+                      <a:endParaRPr kumimoji="0" lang="en-US" altLang="zh-CN" sz="1100" b="0" i="0" u="none" strike="noStrike" kern="1200" cap="none" spc="0" normalizeH="0" baseline="0" noProof="0" dirty="0" smtClean="0">
+                        <a:ln>
+                          <a:noFill/>
+                        </a:ln>
+                        <a:solidFill>
+                          <a:prstClr val="black"/>
+                        </a:solidFill>
+                        <a:effectLst/>
+                        <a:uLnTx/>
+                        <a:uFillTx/>
+                        <a:latin typeface="宋体" panose="02010600030101010101" pitchFamily="2" charset="-122"/>
+                        <a:ea typeface="宋体" panose="02010600030101010101" pitchFamily="2" charset="-122"/>
+                        <a:cs typeface="+mn-cs"/>
+                      </a:endParaRPr>
+                    </a:p>
+                  </a:txBody>
+                  <a:tcPr anchor="ctr"/>
+                </a:tc>
+                <a:tc>
+                  <a:txBody>
+                    <a:bodyPr/>
+                    <a:lstStyle/>
+                    <a:p>
+                      <a:pPr marL="0" marR="0" lvl="0" indent="0" algn="l" defTabSz="914400" rtl="0" eaLnBrk="1" fontAlgn="auto" latinLnBrk="0" hangingPunct="1">
+                        <a:lnSpc>
+                          <a:spcPct val="100000"/>
+                        </a:lnSpc>
+                        <a:spcBef>
+                          <a:spcPts val="0"/>
+                        </a:spcBef>
+                        <a:spcAft>
+                          <a:spcPts val="0"/>
+                        </a:spcAft>
+                        <a:buClrTx/>
+                        <a:buSzTx/>
+                        <a:buFontTx/>
+                        <a:buNone/>
+                        <a:tabLst/>
+                        <a:defRPr/>
+                      </a:pPr>
+                      <a:endParaRPr kumimoji="0" lang="en-US" altLang="zh-CN" sz="1100" b="0" i="0" u="none" strike="noStrike" kern="1200" cap="none" spc="0" normalizeH="0" baseline="0" noProof="0" dirty="0" smtClean="0">
+                        <a:ln>
+                          <a:noFill/>
+                        </a:ln>
+                        <a:solidFill>
+                          <a:prstClr val="black"/>
+                        </a:solidFill>
+                        <a:effectLst/>
+                        <a:uLnTx/>
+                        <a:uFillTx/>
+                        <a:latin typeface="宋体" panose="02010600030101010101" pitchFamily="2" charset="-122"/>
+                        <a:ea typeface="宋体" panose="02010600030101010101" pitchFamily="2" charset="-122"/>
+                        <a:cs typeface="+mn-cs"/>
+                      </a:endParaRPr>
+                    </a:p>
+                  </a:txBody>
+                  <a:tcPr anchor="ctr"/>
+                </a:tc>
+                <a:extLst>
+                  <a:ext uri="{0D108BD9-81ED-4DB2-BD59-A6C34878D82A}">
+                    <a16:rowId xmlns:a16="http://schemas.microsoft.com/office/drawing/2014/main" val="3803748160"/>
+                  </a:ext>
+                </a:extLst>
+              </a:tr>
+              <a:tr h="430456">
+                <a:tc>
+                  <a:txBody>
+                    <a:bodyPr/>
+                    <a:lstStyle/>
+                    <a:p>
+                      <a:pPr marL="0" marR="0" lvl="0" indent="0" algn="l" defTabSz="914400" rtl="0" eaLnBrk="1" fontAlgn="auto" latinLnBrk="0" hangingPunct="1">
+                        <a:lnSpc>
+                          <a:spcPct val="100000"/>
+                        </a:lnSpc>
+                        <a:spcBef>
+                          <a:spcPts val="0"/>
+                        </a:spcBef>
+                        <a:spcAft>
+                          <a:spcPts val="0"/>
+                        </a:spcAft>
+                        <a:buClrTx/>
+                        <a:buSzTx/>
+                        <a:buFontTx/>
+                        <a:buNone/>
+                        <a:tabLst/>
+                        <a:defRPr/>
+                      </a:pPr>
+                      <a:r>
+                        <a:rPr kumimoji="0" lang="en-US" altLang="zh-CN" sz="1100" b="1" i="0" u="none" strike="noStrike" kern="1200" cap="none" spc="0" normalizeH="0" baseline="0" noProof="0" dirty="0" err="1" smtClean="0">
+                          <a:ln>
+                            <a:noFill/>
+                          </a:ln>
+                          <a:solidFill>
+                            <a:prstClr val="black"/>
+                          </a:solidFill>
+                          <a:effectLst/>
+                          <a:uLnTx/>
+                          <a:uFillTx/>
+                          <a:latin typeface="宋体" panose="02010600030101010101" pitchFamily="2" charset="-122"/>
+                          <a:ea typeface="宋体" panose="02010600030101010101" pitchFamily="2" charset="-122"/>
+                          <a:cs typeface="+mn-cs"/>
+                        </a:rPr>
+                        <a:t>Uv</a:t>
+                      </a:r>
+                      <a:endParaRPr kumimoji="0" lang="en-US" altLang="zh-CN" sz="1100" b="1" i="0" u="none" strike="noStrike" kern="1200" cap="none" spc="0" normalizeH="0" baseline="0" noProof="0" dirty="0" smtClean="0">
+                        <a:ln>
+                          <a:noFill/>
+                        </a:ln>
+                        <a:solidFill>
+                          <a:prstClr val="black"/>
+                        </a:solidFill>
+                        <a:effectLst/>
+                        <a:uLnTx/>
+                        <a:uFillTx/>
+                        <a:latin typeface="宋体" panose="02010600030101010101" pitchFamily="2" charset="-122"/>
+                        <a:ea typeface="宋体" panose="02010600030101010101" pitchFamily="2" charset="-122"/>
+                        <a:cs typeface="+mn-cs"/>
+                      </a:endParaRPr>
+                    </a:p>
+                  </a:txBody>
+                  <a:tcPr anchor="ctr"/>
+                </a:tc>
+                <a:tc>
+                  <a:txBody>
+                    <a:bodyPr/>
+                    <a:lstStyle/>
+                    <a:p>
+                      <a:pPr marL="0" marR="0" lvl="0" indent="0" algn="l" defTabSz="914400" rtl="0" eaLnBrk="1" fontAlgn="auto" latinLnBrk="0" hangingPunct="1">
+                        <a:lnSpc>
+                          <a:spcPct val="100000"/>
+                        </a:lnSpc>
+                        <a:spcBef>
+                          <a:spcPts val="0"/>
+                        </a:spcBef>
+                        <a:spcAft>
+                          <a:spcPts val="0"/>
+                        </a:spcAft>
+                        <a:buClrTx/>
+                        <a:buSzTx/>
+                        <a:buFontTx/>
+                        <a:buNone/>
+                        <a:tabLst/>
+                        <a:defRPr/>
+                      </a:pPr>
+                      <a:r>
+                        <a:rPr lang="zh-CN" altLang="en-US" sz="1100" b="0" i="0" kern="1200" dirty="0" smtClean="0">
+                          <a:solidFill>
+                            <a:schemeClr val="dk1"/>
+                          </a:solidFill>
+                          <a:effectLst/>
+                          <a:latin typeface="宋体" panose="02010600030101010101" pitchFamily="2" charset="-122"/>
+                          <a:ea typeface="宋体" panose="02010600030101010101" pitchFamily="2" charset="-122"/>
+                          <a:cs typeface="+mn-cs"/>
+                        </a:rPr>
+                        <a:t>网站独立访客</a:t>
+                      </a:r>
+                      <a:endParaRPr kumimoji="0" lang="en-US" altLang="zh-CN" sz="1100" b="0" i="0" u="none" strike="noStrike" kern="1200" cap="none" spc="0" normalizeH="0" baseline="0" noProof="0" dirty="0" smtClean="0">
+                        <a:ln>
+                          <a:noFill/>
+                        </a:ln>
+                        <a:solidFill>
+                          <a:prstClr val="black"/>
+                        </a:solidFill>
+                        <a:effectLst/>
+                        <a:uLnTx/>
+                        <a:uFillTx/>
+                        <a:latin typeface="宋体" panose="02010600030101010101" pitchFamily="2" charset="-122"/>
+                        <a:ea typeface="宋体" panose="02010600030101010101" pitchFamily="2" charset="-122"/>
+                        <a:cs typeface="+mn-cs"/>
+                      </a:endParaRPr>
+                    </a:p>
+                  </a:txBody>
+                  <a:tcPr anchor="ctr"/>
+                </a:tc>
+                <a:tc>
+                  <a:txBody>
+                    <a:bodyPr/>
+                    <a:lstStyle/>
+                    <a:p>
+                      <a:pPr marL="0" marR="0" lvl="0" indent="0" algn="l" defTabSz="914400" rtl="0" eaLnBrk="1" fontAlgn="auto" latinLnBrk="0" hangingPunct="1">
+                        <a:lnSpc>
+                          <a:spcPct val="100000"/>
+                        </a:lnSpc>
+                        <a:spcBef>
+                          <a:spcPts val="0"/>
+                        </a:spcBef>
+                        <a:spcAft>
+                          <a:spcPts val="0"/>
+                        </a:spcAft>
+                        <a:buClrTx/>
+                        <a:buSzTx/>
+                        <a:buFontTx/>
+                        <a:buNone/>
+                        <a:tabLst/>
+                        <a:defRPr/>
+                      </a:pPr>
+                      <a:endParaRPr kumimoji="0" lang="en-US" altLang="zh-CN" sz="1100" b="0" i="0" u="none" strike="noStrike" kern="1200" cap="none" spc="0" normalizeH="0" baseline="0" noProof="0" dirty="0" smtClean="0">
+                        <a:ln>
+                          <a:noFill/>
+                        </a:ln>
+                        <a:solidFill>
+                          <a:prstClr val="black"/>
+                        </a:solidFill>
+                        <a:effectLst/>
+                        <a:uLnTx/>
+                        <a:uFillTx/>
+                        <a:latin typeface="宋体" panose="02010600030101010101" pitchFamily="2" charset="-122"/>
+                        <a:ea typeface="宋体" panose="02010600030101010101" pitchFamily="2" charset="-122"/>
+                        <a:cs typeface="+mn-cs"/>
+                      </a:endParaRPr>
+                    </a:p>
+                  </a:txBody>
+                  <a:tcPr anchor="ctr"/>
+                </a:tc>
+                <a:extLst>
+                  <a:ext uri="{0D108BD9-81ED-4DB2-BD59-A6C34878D82A}">
+                    <a16:rowId xmlns:a16="http://schemas.microsoft.com/office/drawing/2014/main" val="928917506"/>
+                  </a:ext>
+                </a:extLst>
+              </a:tr>
+              <a:tr h="430456">
+                <a:tc>
+                  <a:txBody>
+                    <a:bodyPr/>
+                    <a:lstStyle/>
+                    <a:p>
+                      <a:pPr marL="0" marR="0" lvl="0" indent="0" algn="l" defTabSz="914400" rtl="0" eaLnBrk="1" fontAlgn="auto" latinLnBrk="0" hangingPunct="1">
+                        <a:lnSpc>
+                          <a:spcPct val="100000"/>
+                        </a:lnSpc>
+                        <a:spcBef>
+                          <a:spcPts val="0"/>
+                        </a:spcBef>
+                        <a:spcAft>
+                          <a:spcPts val="0"/>
+                        </a:spcAft>
+                        <a:buClrTx/>
+                        <a:buSzTx/>
+                        <a:buFontTx/>
+                        <a:buNone/>
+                        <a:tabLst/>
+                        <a:defRPr/>
+                      </a:pPr>
+                      <a:r>
+                        <a:rPr kumimoji="0" lang="en-US" altLang="zh-CN" sz="1100" b="1" i="0" u="none" strike="noStrike" kern="1200" cap="none" spc="0" normalizeH="0" baseline="0" noProof="0" dirty="0" err="1" smtClean="0">
+                          <a:ln>
+                            <a:noFill/>
+                          </a:ln>
+                          <a:solidFill>
+                            <a:prstClr val="black"/>
+                          </a:solidFill>
+                          <a:effectLst/>
+                          <a:uLnTx/>
+                          <a:uFillTx/>
+                          <a:latin typeface="宋体" panose="02010600030101010101" pitchFamily="2" charset="-122"/>
+                          <a:ea typeface="宋体" panose="02010600030101010101" pitchFamily="2" charset="-122"/>
+                          <a:cs typeface="+mn-cs"/>
+                        </a:rPr>
+                        <a:t>Pv</a:t>
+                      </a:r>
+                      <a:r>
+                        <a:rPr kumimoji="0" lang="en-US" altLang="zh-CN" sz="1100" b="1" i="0" u="none" strike="noStrike" kern="1200" cap="none" spc="0" normalizeH="0" baseline="0" noProof="0" dirty="0" smtClean="0">
+                          <a:ln>
+                            <a:noFill/>
+                          </a:ln>
+                          <a:solidFill>
+                            <a:prstClr val="black"/>
+                          </a:solidFill>
+                          <a:effectLst/>
+                          <a:uLnTx/>
+                          <a:uFillTx/>
+                          <a:latin typeface="宋体" panose="02010600030101010101" pitchFamily="2" charset="-122"/>
+                          <a:ea typeface="宋体" panose="02010600030101010101" pitchFamily="2" charset="-122"/>
+                          <a:cs typeface="+mn-cs"/>
+                        </a:rPr>
+                        <a:t>/</a:t>
+                      </a:r>
+                      <a:r>
+                        <a:rPr kumimoji="0" lang="en-US" altLang="zh-CN" sz="1100" b="1" i="0" u="none" strike="noStrike" kern="1200" cap="none" spc="0" normalizeH="0" baseline="0" noProof="0" dirty="0" err="1" smtClean="0">
+                          <a:ln>
+                            <a:noFill/>
+                          </a:ln>
+                          <a:solidFill>
+                            <a:prstClr val="black"/>
+                          </a:solidFill>
+                          <a:effectLst/>
+                          <a:uLnTx/>
+                          <a:uFillTx/>
+                          <a:latin typeface="宋体" panose="02010600030101010101" pitchFamily="2" charset="-122"/>
+                          <a:ea typeface="宋体" panose="02010600030101010101" pitchFamily="2" charset="-122"/>
+                          <a:cs typeface="+mn-cs"/>
+                        </a:rPr>
+                        <a:t>Uv</a:t>
+                      </a:r>
+                      <a:endParaRPr kumimoji="0" lang="en-US" altLang="zh-CN" sz="1100" b="1" i="0" u="none" strike="noStrike" kern="1200" cap="none" spc="0" normalizeH="0" baseline="0" noProof="0" dirty="0" smtClean="0">
+                        <a:ln>
+                          <a:noFill/>
+                        </a:ln>
+                        <a:solidFill>
+                          <a:prstClr val="black"/>
+                        </a:solidFill>
+                        <a:effectLst/>
+                        <a:uLnTx/>
+                        <a:uFillTx/>
+                        <a:latin typeface="宋体" panose="02010600030101010101" pitchFamily="2" charset="-122"/>
+                        <a:ea typeface="宋体" panose="02010600030101010101" pitchFamily="2" charset="-122"/>
+                        <a:cs typeface="+mn-cs"/>
+                      </a:endParaRPr>
+                    </a:p>
+                  </a:txBody>
+                  <a:tcPr anchor="ctr"/>
+                </a:tc>
+                <a:tc>
+                  <a:txBody>
+                    <a:bodyPr/>
+                    <a:lstStyle/>
+                    <a:p>
+                      <a:pPr marL="0" marR="0" lvl="0" indent="0" algn="l" defTabSz="914400" rtl="0" eaLnBrk="1" fontAlgn="auto" latinLnBrk="0" hangingPunct="1">
+                        <a:lnSpc>
+                          <a:spcPct val="100000"/>
+                        </a:lnSpc>
+                        <a:spcBef>
+                          <a:spcPts val="0"/>
+                        </a:spcBef>
+                        <a:spcAft>
+                          <a:spcPts val="0"/>
+                        </a:spcAft>
+                        <a:buClrTx/>
+                        <a:buSzTx/>
+                        <a:buFontTx/>
+                        <a:buNone/>
+                        <a:tabLst/>
+                        <a:defRPr/>
+                      </a:pPr>
+                      <a:r>
+                        <a:rPr kumimoji="0" lang="en-US" altLang="zh-CN" sz="1100" b="0" i="0" u="none" strike="noStrike" kern="1200" cap="none" spc="0" normalizeH="0" baseline="0" noProof="0" dirty="0" smtClean="0">
+                          <a:ln>
+                            <a:noFill/>
+                          </a:ln>
+                          <a:solidFill>
+                            <a:prstClr val="black"/>
+                          </a:solidFill>
+                          <a:effectLst/>
+                          <a:uLnTx/>
+                          <a:uFillTx/>
+                          <a:latin typeface="宋体" panose="02010600030101010101" pitchFamily="2" charset="-122"/>
+                          <a:ea typeface="宋体" panose="02010600030101010101" pitchFamily="2" charset="-122"/>
+                          <a:cs typeface="+mn-cs"/>
+                        </a:rPr>
+                        <a:t>20</a:t>
+                      </a:r>
+                      <a:endParaRPr kumimoji="0" lang="en-US" altLang="zh-CN" sz="1100" b="0" i="0" u="none" strike="noStrike" kern="1200" cap="none" spc="0" normalizeH="0" baseline="0" noProof="0" dirty="0" smtClean="0">
+                        <a:ln>
+                          <a:noFill/>
+                        </a:ln>
+                        <a:solidFill>
+                          <a:prstClr val="black"/>
+                        </a:solidFill>
+                        <a:effectLst/>
+                        <a:uLnTx/>
+                        <a:uFillTx/>
+                        <a:latin typeface="宋体" panose="02010600030101010101" pitchFamily="2" charset="-122"/>
+                        <a:ea typeface="宋体" panose="02010600030101010101" pitchFamily="2" charset="-122"/>
+                        <a:cs typeface="+mn-cs"/>
+                      </a:endParaRPr>
+                    </a:p>
+                  </a:txBody>
+                  <a:tcPr anchor="ctr"/>
+                </a:tc>
+                <a:tc>
+                  <a:txBody>
+                    <a:bodyPr/>
+                    <a:lstStyle/>
+                    <a:p>
+                      <a:pPr marL="0" marR="0" lvl="0" indent="0" algn="l" defTabSz="914400" rtl="0" eaLnBrk="1" fontAlgn="auto" latinLnBrk="0" hangingPunct="1">
+                        <a:lnSpc>
+                          <a:spcPct val="100000"/>
+                        </a:lnSpc>
+                        <a:spcBef>
+                          <a:spcPts val="0"/>
+                        </a:spcBef>
+                        <a:spcAft>
+                          <a:spcPts val="0"/>
+                        </a:spcAft>
+                        <a:buClrTx/>
+                        <a:buSzTx/>
+                        <a:buFontTx/>
+                        <a:buNone/>
+                        <a:tabLst/>
+                        <a:defRPr/>
+                      </a:pPr>
+                      <a:r>
+                        <a:rPr kumimoji="0" lang="zh-CN" altLang="en-US" sz="1100" b="0" i="0" u="none" strike="noStrike" kern="1200" cap="none" spc="0" normalizeH="0" baseline="0" noProof="0" dirty="0" smtClean="0">
+                          <a:ln>
+                            <a:noFill/>
+                          </a:ln>
+                          <a:solidFill>
+                            <a:prstClr val="black"/>
+                          </a:solidFill>
+                          <a:effectLst/>
+                          <a:uLnTx/>
+                          <a:uFillTx/>
+                          <a:latin typeface="宋体" panose="02010600030101010101" pitchFamily="2" charset="-122"/>
+                          <a:ea typeface="宋体" panose="02010600030101010101" pitchFamily="2" charset="-122"/>
+                          <a:cs typeface="+mn-cs"/>
+                        </a:rPr>
+                        <a:t>艾瑞统计，经验模型</a:t>
+                      </a:r>
+                      <a:endParaRPr kumimoji="0" lang="en-US" altLang="zh-CN" sz="1100" b="0" i="0" u="none" strike="noStrike" kern="1200" cap="none" spc="0" normalizeH="0" baseline="0" noProof="0" dirty="0" smtClean="0">
+                        <a:ln>
+                          <a:noFill/>
+                        </a:ln>
+                        <a:solidFill>
+                          <a:prstClr val="black"/>
+                        </a:solidFill>
+                        <a:effectLst/>
+                        <a:uLnTx/>
+                        <a:uFillTx/>
+                        <a:latin typeface="宋体" panose="02010600030101010101" pitchFamily="2" charset="-122"/>
+                        <a:ea typeface="宋体" panose="02010600030101010101" pitchFamily="2" charset="-122"/>
+                        <a:cs typeface="+mn-cs"/>
+                      </a:endParaRPr>
+                    </a:p>
+                  </a:txBody>
+                  <a:tcPr anchor="ctr"/>
+                </a:tc>
+                <a:extLst>
+                  <a:ext uri="{0D108BD9-81ED-4DB2-BD59-A6C34878D82A}">
+                    <a16:rowId xmlns:a16="http://schemas.microsoft.com/office/drawing/2014/main" val="3011235701"/>
+                  </a:ext>
+                </a:extLst>
+              </a:tr>
+            </a:tbl>
+          </a:graphicData>
+        </a:graphic>
+      </p:graphicFrame>
+    </p:spTree>
+    <p:extLst>
+      <p:ext uri="{BB962C8B-B14F-4D97-AF65-F5344CB8AC3E}">
+        <p14:creationId xmlns:p14="http://schemas.microsoft.com/office/powerpoint/2010/main" val="3409300048"/>
+      </p:ext>
+    </p:extLst>
+  </p:cSld>
+  <p:clrMapOvr>
+    <a:masterClrMapping/>
+  </p:clrMapOvr>
+  <p:timing>
+    <p:tnLst>
+      <p:par>
+        <p:cTn id="1" dur="indefinite" restart="never" nodeType="tmRoot"/>
+      </p:par>
+    </p:tnLst>
+  </p:timing>
+</p:sld>
+</file>
+
+<file path=ppt/slides/slide13.xml><?xml version="1.0" encoding="utf-8"?>
+<p:sld xmlns:a="http://schemas.openxmlformats.org/drawingml/2006/main" xmlns:r="http://schemas.openxmlformats.org/officeDocument/2006/relationships" xmlns:p="http://schemas.openxmlformats.org/presentationml/2006/main">
+  <p:cSld>
+    <p:spTree>
+      <p:nvGrpSpPr>
+        <p:cNvPr id="1" name=""/>
+        <p:cNvGrpSpPr/>
+        <p:nvPr/>
+      </p:nvGrpSpPr>
+      <p:grpSpPr>
+        <a:xfrm>
+          <a:off x="0" y="0"/>
+          <a:ext cx="0" cy="0"/>
+          <a:chOff x="0" y="0"/>
+          <a:chExt cx="0" cy="0"/>
+        </a:xfrm>
+      </p:grpSpPr>
+      <p:sp>
+        <p:nvSpPr>
+          <p:cNvPr id="4" name="标题 3"/>
+          <p:cNvSpPr>
+            <a:spLocks noGrp="1"/>
+          </p:cNvSpPr>
+          <p:nvPr>
+            <p:ph type="title"/>
+          </p:nvPr>
+        </p:nvSpPr>
+        <p:spPr>
+          <a:xfrm>
+            <a:off x="767998" y="643467"/>
+            <a:ext cx="2939030" cy="5571066"/>
+          </a:xfrm>
+        </p:spPr>
+        <p:txBody>
+          <a:bodyPr lIns="0" tIns="0" rIns="0" bIns="0" rtlCol="0">
+            <a:noAutofit/>
+          </a:bodyPr>
+          <a:lstStyle/>
+          <a:p>
+            <a:r>
               <a:rPr lang="zh-CN" altLang="en-US" sz="4600" spc="-150" dirty="0"/>
               <a:t>汇总</a:t>
             </a:r>
@@ -14169,7 +16317,7 @@
 </p:sld>
 </file>
 
-<file path=ppt/slides/slide13.xml><?xml version="1.0" encoding="utf-8"?>
+<file path=ppt/slides/slide14.xml><?xml version="1.0" encoding="utf-8"?>
 <p:sld xmlns:a="http://schemas.openxmlformats.org/drawingml/2006/main" xmlns:r="http://schemas.openxmlformats.org/officeDocument/2006/relationships" xmlns:p="http://schemas.openxmlformats.org/presentationml/2006/main">
   <p:cSld>
     <p:spTree>
@@ -14348,7 +16496,7 @@
 </p:sld>
 </file>
 
-<file path=ppt/slides/slide14.xml><?xml version="1.0" encoding="utf-8"?>
+<file path=ppt/slides/slide15.xml><?xml version="1.0" encoding="utf-8"?>
 <p:sld xmlns:a="http://schemas.openxmlformats.org/drawingml/2006/main" xmlns:r="http://schemas.openxmlformats.org/officeDocument/2006/relationships" xmlns:p="http://schemas.openxmlformats.org/presentationml/2006/main">
   <p:cSld>
     <p:spTree>
@@ -14523,7 +16671,7 @@
 </p:sld>
 </file>
 
-<file path=ppt/slides/slide15.xml><?xml version="1.0" encoding="utf-8"?>
+<file path=ppt/slides/slide16.xml><?xml version="1.0" encoding="utf-8"?>
 <p:sld xmlns:a="http://schemas.openxmlformats.org/drawingml/2006/main" xmlns:r="http://schemas.openxmlformats.org/officeDocument/2006/relationships" xmlns:p="http://schemas.openxmlformats.org/presentationml/2006/main">
   <p:cSld>
     <p:spTree>
@@ -14646,7 +16794,7 @@
 </p:sld>
 </file>
 
-<file path=ppt/slides/slide16.xml><?xml version="1.0" encoding="utf-8"?>
+<file path=ppt/slides/slide17.xml><?xml version="1.0" encoding="utf-8"?>
 <p:sld xmlns:a="http://schemas.openxmlformats.org/drawingml/2006/main" xmlns:r="http://schemas.openxmlformats.org/officeDocument/2006/relationships" xmlns:p="http://schemas.openxmlformats.org/presentationml/2006/main">
   <p:cSld>
     <p:spTree>
@@ -14773,7 +16921,7 @@
 </p:sld>
 </file>
 
-<file path=ppt/slides/slide17.xml><?xml version="1.0" encoding="utf-8"?>
+<file path=ppt/slides/slide18.xml><?xml version="1.0" encoding="utf-8"?>
 <p:sld xmlns:a="http://schemas.openxmlformats.org/drawingml/2006/main" xmlns:r="http://schemas.openxmlformats.org/officeDocument/2006/relationships" xmlns:p="http://schemas.openxmlformats.org/presentationml/2006/main">
   <p:cSld>
     <p:spTree>
@@ -14872,7 +17020,7 @@
 </p:sld>
 </file>
 
-<file path=ppt/slides/slide18.xml><?xml version="1.0" encoding="utf-8"?>
+<file path=ppt/slides/slide19.xml><?xml version="1.0" encoding="utf-8"?>
 <p:sld xmlns:a="http://schemas.openxmlformats.org/drawingml/2006/main" xmlns:r="http://schemas.openxmlformats.org/officeDocument/2006/relationships" xmlns:p="http://schemas.openxmlformats.org/presentationml/2006/main">
   <p:cSld>
     <p:spTree>
@@ -36536,7 +38684,7 @@
           <p:nvPr>
             <p:extLst>
               <p:ext uri="{D42A27DB-BD31-4B8C-83A1-F6EECF244321}">
-                <p14:modId xmlns:p14="http://schemas.microsoft.com/office/powerpoint/2010/main" val="1476649714"/>
+                <p14:modId xmlns:p14="http://schemas.microsoft.com/office/powerpoint/2010/main" val="2335912002"/>
               </p:ext>
             </p:extLst>
           </p:nvPr>
@@ -36559,17 +38707,10 @@
                     </a:ext>
                   </a:extLst>
                 </a:gridCol>
-                <a:gridCol w="3522306">
+                <a:gridCol w="4009494">
                   <a:extLst>
                     <a:ext uri="{9D8B030D-6E8A-4147-A177-3AD203B41FA5}">
                       <a16:colId xmlns:a16="http://schemas.microsoft.com/office/drawing/2014/main" val="2436388290"/>
-                    </a:ext>
-                  </a:extLst>
-                </a:gridCol>
-                <a:gridCol w="487188">
-                  <a:extLst>
-                    <a:ext uri="{9D8B030D-6E8A-4147-A177-3AD203B41FA5}">
-                      <a16:colId xmlns:a16="http://schemas.microsoft.com/office/drawing/2014/main" val="4034555908"/>
                     </a:ext>
                   </a:extLst>
                 </a:gridCol>
@@ -36596,7 +38737,7 @@
                   </a:txBody>
                   <a:tcPr/>
                 </a:tc>
-                <a:tc gridSpan="2">
+                <a:tc>
                   <a:txBody>
                     <a:bodyPr/>
                     <a:lstStyle/>
@@ -36609,20 +38750,6 @@
                         </a:rPr>
                         <a:t>方式</a:t>
                       </a:r>
-                      <a:endParaRPr lang="zh-CN" altLang="en-US" dirty="0">
-                        <a:latin typeface="Microsoft YaHei UI" panose="020B0503020204020204" pitchFamily="34" charset="-122"/>
-                        <a:ea typeface="Microsoft YaHei UI" panose="020B0503020204020204" pitchFamily="34" charset="-122"/>
-                      </a:endParaRPr>
-                    </a:p>
-                  </a:txBody>
-                  <a:tcPr/>
-                </a:tc>
-                <a:tc hMerge="1">
-                  <a:txBody>
-                    <a:bodyPr/>
-                    <a:lstStyle/>
-                    <a:p>
-                      <a:pPr algn="l"/>
                       <a:endParaRPr lang="zh-CN" altLang="en-US" dirty="0">
                         <a:latin typeface="Microsoft YaHei UI" panose="020B0503020204020204" pitchFamily="34" charset="-122"/>
                         <a:ea typeface="Microsoft YaHei UI" panose="020B0503020204020204" pitchFamily="34" charset="-122"/>
@@ -36692,7 +38819,7 @@
                   </a:txBody>
                   <a:tcPr/>
                 </a:tc>
-                <a:tc gridSpan="2">
+                <a:tc>
                   <a:txBody>
                     <a:bodyPr/>
                     <a:lstStyle/>
@@ -36766,19 +38893,6 @@
                   </a:txBody>
                   <a:tcPr/>
                 </a:tc>
-                <a:tc hMerge="1">
-                  <a:txBody>
-                    <a:bodyPr/>
-                    <a:lstStyle/>
-                    <a:p>
-                      <a:endParaRPr lang="en-US" altLang="zh-CN" sz="1050" b="0" dirty="0" smtClean="0">
-                        <a:latin typeface="宋体" panose="02010600030101010101" pitchFamily="2" charset="-122"/>
-                        <a:ea typeface="宋体" panose="02010600030101010101" pitchFamily="2" charset="-122"/>
-                      </a:endParaRPr>
-                    </a:p>
-                  </a:txBody>
-                  <a:tcPr/>
-                </a:tc>
                 <a:tc>
                   <a:txBody>
                     <a:bodyPr/>
@@ -36825,7 +38939,7 @@
                   </a:txBody>
                   <a:tcPr/>
                 </a:tc>
-                <a:tc gridSpan="2">
+                <a:tc>
                   <a:txBody>
                     <a:bodyPr/>
                     <a:lstStyle/>
@@ -37616,19 +39730,6 @@
                         <a:latin typeface="宋体" panose="02010600030101010101" pitchFamily="2" charset="-122"/>
                         <a:ea typeface="宋体" panose="02010600030101010101" pitchFamily="2" charset="-122"/>
                         <a:cs typeface="+mn-cs"/>
-                      </a:endParaRPr>
-                    </a:p>
-                  </a:txBody>
-                  <a:tcPr/>
-                </a:tc>
-                <a:tc hMerge="1">
-                  <a:txBody>
-                    <a:bodyPr/>
-                    <a:lstStyle/>
-                    <a:p>
-                      <a:endParaRPr lang="zh-CN" altLang="en-US" sz="1050" b="0" dirty="0">
-                        <a:latin typeface="宋体" panose="02010600030101010101" pitchFamily="2" charset="-122"/>
-                        <a:ea typeface="宋体" panose="02010600030101010101" pitchFamily="2" charset="-122"/>
                       </a:endParaRPr>
                     </a:p>
                   </a:txBody>
@@ -37934,22 +40035,15 @@
                           <a:latin typeface="宋体" panose="02010600030101010101" pitchFamily="2" charset="-122"/>
                           <a:ea typeface="宋体" panose="02010600030101010101" pitchFamily="2" charset="-122"/>
                         </a:rPr>
-                        <a:t>20%</a:t>
+                        <a:t>20</a:t>
                       </a:r>
-                      <a:endParaRPr lang="zh-CN" altLang="en-US" sz="1050" b="0" dirty="0">
-                        <a:latin typeface="宋体" panose="02010600030101010101" pitchFamily="2" charset="-122"/>
-                        <a:ea typeface="宋体" panose="02010600030101010101" pitchFamily="2" charset="-122"/>
-                      </a:endParaRPr>
-                    </a:p>
-                  </a:txBody>
-                  <a:tcPr/>
-                </a:tc>
-                <a:tc>
-                  <a:txBody>
-                    <a:bodyPr/>
-                    <a:lstStyle/>
-                    <a:p>
-                      <a:pPr algn="l"/>
+                      <a:r>
+                        <a:rPr lang="en-US" altLang="zh-CN" sz="1050" b="0" dirty="0" smtClean="0">
+                          <a:latin typeface="宋体" panose="02010600030101010101" pitchFamily="2" charset="-122"/>
+                          <a:ea typeface="宋体" panose="02010600030101010101" pitchFamily="2" charset="-122"/>
+                        </a:rPr>
+                        <a:t>%</a:t>
+                      </a:r>
                       <a:endParaRPr lang="zh-CN" altLang="en-US" sz="1050" b="0" dirty="0">
                         <a:latin typeface="宋体" panose="02010600030101010101" pitchFamily="2" charset="-122"/>
                         <a:ea typeface="宋体" panose="02010600030101010101" pitchFamily="2" charset="-122"/>
@@ -37998,7 +40092,7 @@
                   </a:txBody>
                   <a:tcPr/>
                 </a:tc>
-                <a:tc gridSpan="2">
+                <a:tc>
                   <a:txBody>
                     <a:bodyPr/>
                     <a:lstStyle/>
@@ -38087,19 +40181,6 @@
                         </a:rPr>
                         <a:t>月</a:t>
                       </a:r>
-                      <a:endParaRPr lang="zh-CN" altLang="en-US" sz="1050" b="0" dirty="0">
-                        <a:latin typeface="宋体" panose="02010600030101010101" pitchFamily="2" charset="-122"/>
-                        <a:ea typeface="宋体" panose="02010600030101010101" pitchFamily="2" charset="-122"/>
-                      </a:endParaRPr>
-                    </a:p>
-                  </a:txBody>
-                  <a:tcPr/>
-                </a:tc>
-                <a:tc hMerge="1">
-                  <a:txBody>
-                    <a:bodyPr/>
-                    <a:lstStyle/>
-                    <a:p>
                       <a:endParaRPr lang="zh-CN" altLang="en-US" sz="1050" b="0" dirty="0">
                         <a:latin typeface="宋体" panose="02010600030101010101" pitchFamily="2" charset="-122"/>
                         <a:ea typeface="宋体" panose="02010600030101010101" pitchFamily="2" charset="-122"/>
@@ -39010,6 +41091,14 @@
 </file>
 
 <file path=customXml/item1.xml><?xml version="1.0" encoding="utf-8"?>
+<p:properties xmlns:p="http://schemas.microsoft.com/office/2006/metadata/properties" xmlns:xsi="http://www.w3.org/2001/XMLSchema-instance" xmlns:pc="http://schemas.microsoft.com/office/infopath/2007/PartnerControls">
+  <documentManagement>
+    <MediaServiceKeyPoints xmlns="71af3243-3dd4-4a8d-8c0d-dd76da1f02a5" xsi:nil="true"/>
+  </documentManagement>
+</p:properties>
+</file>
+
+<file path=customXml/item2.xml><?xml version="1.0" encoding="utf-8"?>
 <ct:contentTypeSchema xmlns:ct="http://schemas.microsoft.com/office/2006/metadata/contentType" xmlns:ma="http://schemas.microsoft.com/office/2006/metadata/properties/metaAttributes" ct:_="" ma:_="" ma:contentTypeName="Document" ma:contentTypeID="0x01010079F111ED35F8CC479449609E8A0923A6" ma:contentTypeVersion="10" ma:contentTypeDescription="Create a new document." ma:contentTypeScope="" ma:versionID="e39e7e9e36de66d473ce04bb4ab2dbb8">
   <xsd:schema xmlns:xsd="http://www.w3.org/2001/XMLSchema" xmlns:xs="http://www.w3.org/2001/XMLSchema" xmlns:p="http://schemas.microsoft.com/office/2006/metadata/properties" xmlns:ns2="71af3243-3dd4-4a8d-8c0d-dd76da1f02a5" xmlns:ns3="16c05727-aa75-4e4a-9b5f-8a80a1165891" targetNamespace="http://schemas.microsoft.com/office/2006/metadata/properties" ma:root="true" ma:fieldsID="19dc5994665da46609c24125788630d8" ns2:_="" ns3:_="">
     <xsd:import namespace="71af3243-3dd4-4a8d-8c0d-dd76da1f02a5"/>
@@ -39214,14 +41303,6 @@
 </ct:contentTypeSchema>
 </file>
 
-<file path=customXml/item2.xml><?xml version="1.0" encoding="utf-8"?>
-<p:properties xmlns:p="http://schemas.microsoft.com/office/2006/metadata/properties" xmlns:xsi="http://www.w3.org/2001/XMLSchema-instance" xmlns:pc="http://schemas.microsoft.com/office/infopath/2007/PartnerControls">
-  <documentManagement>
-    <MediaServiceKeyPoints xmlns="71af3243-3dd4-4a8d-8c0d-dd76da1f02a5" xsi:nil="true"/>
-  </documentManagement>
-</p:properties>
-</file>
-
 <file path=customXml/item3.xml><?xml version="1.0" encoding="utf-8"?>
 <?mso-contentType ?>
 <FormTemplates xmlns="http://schemas.microsoft.com/sharepoint/v3/contenttype/forms">
@@ -39232,6 +41313,23 @@
 </file>
 
 <file path=customXml/itemProps1.xml><?xml version="1.0" encoding="utf-8"?>
+<ds:datastoreItem xmlns:ds="http://schemas.openxmlformats.org/officeDocument/2006/customXml" ds:itemID="{C67D7A17-86F0-479A-99ED-25A5B5927E3A}">
+  <ds:schemaRefs>
+    <ds:schemaRef ds:uri="http://purl.org/dc/elements/1.1/"/>
+    <ds:schemaRef ds:uri="http://schemas.microsoft.com/office/2006/metadata/properties"/>
+    <ds:schemaRef ds:uri="http://purl.org/dc/terms/"/>
+    <ds:schemaRef ds:uri="http://purl.org/dc/dcmitype/"/>
+    <ds:schemaRef ds:uri="http://schemas.microsoft.com/office/infopath/2007/PartnerControls"/>
+    <ds:schemaRef ds:uri="16c05727-aa75-4e4a-9b5f-8a80a1165891"/>
+    <ds:schemaRef ds:uri="http://schemas.microsoft.com/office/2006/documentManagement/types"/>
+    <ds:schemaRef ds:uri="http://schemas.openxmlformats.org/package/2006/metadata/core-properties"/>
+    <ds:schemaRef ds:uri="71af3243-3dd4-4a8d-8c0d-dd76da1f02a5"/>
+    <ds:schemaRef ds:uri="http://www.w3.org/XML/1998/namespace"/>
+  </ds:schemaRefs>
+</ds:datastoreItem>
+</file>
+
+<file path=customXml/itemProps2.xml><?xml version="1.0" encoding="utf-8"?>
 <ds:datastoreItem xmlns:ds="http://schemas.openxmlformats.org/officeDocument/2006/customXml" ds:itemID="{684D18DA-07F0-42AA-A4D8-DA1A93EE23D0}">
   <ds:schemaRefs>
     <ds:schemaRef ds:uri="http://schemas.microsoft.com/office/2006/metadata/contentType"/>
@@ -39250,23 +41348,6 @@
 </ds:datastoreItem>
 </file>
 
-<file path=customXml/itemProps2.xml><?xml version="1.0" encoding="utf-8"?>
-<ds:datastoreItem xmlns:ds="http://schemas.openxmlformats.org/officeDocument/2006/customXml" ds:itemID="{C67D7A17-86F0-479A-99ED-25A5B5927E3A}">
-  <ds:schemaRefs>
-    <ds:schemaRef ds:uri="http://purl.org/dc/elements/1.1/"/>
-    <ds:schemaRef ds:uri="http://schemas.microsoft.com/office/2006/metadata/properties"/>
-    <ds:schemaRef ds:uri="http://purl.org/dc/terms/"/>
-    <ds:schemaRef ds:uri="http://purl.org/dc/dcmitype/"/>
-    <ds:schemaRef ds:uri="http://schemas.microsoft.com/office/infopath/2007/PartnerControls"/>
-    <ds:schemaRef ds:uri="16c05727-aa75-4e4a-9b5f-8a80a1165891"/>
-    <ds:schemaRef ds:uri="http://schemas.microsoft.com/office/2006/documentManagement/types"/>
-    <ds:schemaRef ds:uri="http://schemas.openxmlformats.org/package/2006/metadata/core-properties"/>
-    <ds:schemaRef ds:uri="71af3243-3dd4-4a8d-8c0d-dd76da1f02a5"/>
-    <ds:schemaRef ds:uri="http://www.w3.org/XML/1998/namespace"/>
-  </ds:schemaRefs>
-</ds:datastoreItem>
-</file>
-
 <file path=customXml/itemProps3.xml><?xml version="1.0" encoding="utf-8"?>
 <ds:datastoreItem xmlns:ds="http://schemas.openxmlformats.org/officeDocument/2006/customXml" ds:itemID="{E1857EDA-311A-4347-A668-7F4377E389B1}">
   <ds:schemaRefs>

</xml_diff>